<commit_message>
More update slides to emphasize contents
</commit_message>
<xml_diff>
--- a/Fluentd meetup 2019.pptx
+++ b/Fluentd meetup 2019.pptx
@@ -16276,7 +16276,7 @@
             <a:avLst/>
           </a:prstGeom>
           <a:noFill/>
-          <a:ln>
+          <a:ln w="31750">
             <a:solidFill>
               <a:srgbClr val="FF0000"/>
             </a:solidFill>
@@ -16328,7 +16328,7 @@
             <a:avLst/>
           </a:prstGeom>
           <a:noFill/>
-          <a:ln>
+          <a:ln w="34925">
             <a:solidFill>
               <a:srgbClr val="FF0000"/>
             </a:solidFill>
@@ -16373,14 +16373,14 @@
         </p:nvSpPr>
         <p:spPr>
           <a:xfrm>
-            <a:off x="6803329" y="6079045"/>
-            <a:ext cx="1106905" cy="315495"/>
+            <a:off x="6249877" y="6079045"/>
+            <a:ext cx="1660358" cy="315495"/>
           </a:xfrm>
           <a:prstGeom prst="ellipse">
             <a:avLst/>
           </a:prstGeom>
           <a:noFill/>
-          <a:ln>
+          <a:ln w="31750">
             <a:solidFill>
               <a:srgbClr val="FF0000"/>
             </a:solidFill>
@@ -16425,14 +16425,14 @@
         </p:nvSpPr>
         <p:spPr>
           <a:xfrm>
-            <a:off x="6426339" y="5532916"/>
-            <a:ext cx="1106905" cy="315495"/>
+            <a:off x="6156297" y="5532916"/>
+            <a:ext cx="1618624" cy="315495"/>
           </a:xfrm>
           <a:prstGeom prst="ellipse">
             <a:avLst/>
           </a:prstGeom>
           <a:noFill/>
-          <a:ln>
+          <a:ln w="34925">
             <a:solidFill>
               <a:srgbClr val="FF0000"/>
             </a:solidFill>
@@ -16478,13 +16478,13 @@
         <p:spPr>
           <a:xfrm>
             <a:off x="6249876" y="4978623"/>
-            <a:ext cx="1106905" cy="315495"/>
+            <a:ext cx="1283368" cy="315495"/>
           </a:xfrm>
           <a:prstGeom prst="ellipse">
             <a:avLst/>
           </a:prstGeom>
           <a:noFill/>
-          <a:ln>
+          <a:ln w="31750">
             <a:solidFill>
               <a:srgbClr val="FF0000"/>
             </a:solidFill>
@@ -16530,13 +16530,13 @@
         <p:spPr>
           <a:xfrm>
             <a:off x="6156297" y="4385982"/>
-            <a:ext cx="1106905" cy="315495"/>
+            <a:ext cx="1618624" cy="315495"/>
           </a:xfrm>
           <a:prstGeom prst="ellipse">
             <a:avLst/>
           </a:prstGeom>
           <a:noFill/>
-          <a:ln>
+          <a:ln w="34925">
             <a:solidFill>
               <a:srgbClr val="FF0000"/>
             </a:solidFill>
@@ -16567,6 +16567,252 @@
           </a:p>
         </p:txBody>
       </p:sp>
+      <p:pic>
+        <p:nvPicPr>
+          <p:cNvPr id="9" name="図 8">
+            <a:extLst>
+              <a:ext uri="{FF2B5EF4-FFF2-40B4-BE49-F238E27FC236}">
+                <a16:creationId xmlns:a16="http://schemas.microsoft.com/office/drawing/2014/main" id="{E8243A4F-7FB2-4ADC-878A-1719828349C5}"/>
+              </a:ext>
+            </a:extLst>
+          </p:cNvPr>
+          <p:cNvPicPr>
+            <a:picLocks noChangeAspect="1"/>
+          </p:cNvPicPr>
+          <p:nvPr/>
+        </p:nvPicPr>
+        <p:blipFill>
+          <a:blip r:embed="rId4">
+            <a:extLst>
+              <a:ext uri="{28A0092B-C50C-407E-A947-70E740481C1C}">
+                <a14:useLocalDpi xmlns:a14="http://schemas.microsoft.com/office/drawing/2010/main" val="0"/>
+              </a:ext>
+            </a:extLst>
+          </a:blip>
+          <a:stretch>
+            <a:fillRect/>
+          </a:stretch>
+        </p:blipFill>
+        <p:spPr>
+          <a:xfrm>
+            <a:off x="5872637" y="1568450"/>
+            <a:ext cx="1861381" cy="412163"/>
+          </a:xfrm>
+          <a:prstGeom prst="rect">
+            <a:avLst/>
+          </a:prstGeom>
+          <a:ln w="28575">
+            <a:solidFill>
+              <a:srgbClr val="FF0000"/>
+            </a:solidFill>
+          </a:ln>
+        </p:spPr>
+      </p:pic>
+      <p:pic>
+        <p:nvPicPr>
+          <p:cNvPr id="11" name="図 10">
+            <a:extLst>
+              <a:ext uri="{FF2B5EF4-FFF2-40B4-BE49-F238E27FC236}">
+                <a16:creationId xmlns:a16="http://schemas.microsoft.com/office/drawing/2014/main" id="{C6F68D80-5070-4C5C-8BA3-8683B2090C55}"/>
+              </a:ext>
+            </a:extLst>
+          </p:cNvPr>
+          <p:cNvPicPr>
+            <a:picLocks noChangeAspect="1"/>
+          </p:cNvPicPr>
+          <p:nvPr/>
+        </p:nvPicPr>
+        <p:blipFill>
+          <a:blip r:embed="rId5">
+            <a:extLst>
+              <a:ext uri="{28A0092B-C50C-407E-A947-70E740481C1C}">
+                <a14:useLocalDpi xmlns:a14="http://schemas.microsoft.com/office/drawing/2010/main" val="0"/>
+              </a:ext>
+            </a:extLst>
+          </a:blip>
+          <a:stretch>
+            <a:fillRect/>
+          </a:stretch>
+        </p:blipFill>
+        <p:spPr>
+          <a:xfrm>
+            <a:off x="5175129" y="2700227"/>
+            <a:ext cx="2629650" cy="314659"/>
+          </a:xfrm>
+          <a:prstGeom prst="rect">
+            <a:avLst/>
+          </a:prstGeom>
+          <a:ln w="31750">
+            <a:solidFill>
+              <a:srgbClr val="FF0000"/>
+            </a:solidFill>
+          </a:ln>
+        </p:spPr>
+      </p:pic>
+      <p:pic>
+        <p:nvPicPr>
+          <p:cNvPr id="16" name="図 15">
+            <a:extLst>
+              <a:ext uri="{FF2B5EF4-FFF2-40B4-BE49-F238E27FC236}">
+                <a16:creationId xmlns:a16="http://schemas.microsoft.com/office/drawing/2014/main" id="{59911B43-9047-4E1E-AEC8-B94882743DD3}"/>
+              </a:ext>
+            </a:extLst>
+          </p:cNvPr>
+          <p:cNvPicPr>
+            <a:picLocks noChangeAspect="1"/>
+          </p:cNvPicPr>
+          <p:nvPr/>
+        </p:nvPicPr>
+        <p:blipFill>
+          <a:blip r:embed="rId6">
+            <a:extLst>
+              <a:ext uri="{28A0092B-C50C-407E-A947-70E740481C1C}">
+                <a14:useLocalDpi xmlns:a14="http://schemas.microsoft.com/office/drawing/2010/main" val="0"/>
+              </a:ext>
+            </a:extLst>
+          </a:blip>
+          <a:stretch>
+            <a:fillRect/>
+          </a:stretch>
+        </p:blipFill>
+        <p:spPr>
+          <a:xfrm>
+            <a:off x="4989324" y="4351365"/>
+            <a:ext cx="2873443" cy="348637"/>
+          </a:xfrm>
+          <a:prstGeom prst="rect">
+            <a:avLst/>
+          </a:prstGeom>
+          <a:ln w="28575">
+            <a:solidFill>
+              <a:srgbClr val="FF0000"/>
+            </a:solidFill>
+          </a:ln>
+        </p:spPr>
+      </p:pic>
+      <p:pic>
+        <p:nvPicPr>
+          <p:cNvPr id="18" name="図 17">
+            <a:extLst>
+              <a:ext uri="{FF2B5EF4-FFF2-40B4-BE49-F238E27FC236}">
+                <a16:creationId xmlns:a16="http://schemas.microsoft.com/office/drawing/2014/main" id="{A5D90178-2505-4EAE-A2D0-AD7D16351625}"/>
+              </a:ext>
+            </a:extLst>
+          </p:cNvPr>
+          <p:cNvPicPr>
+            <a:picLocks noChangeAspect="1"/>
+          </p:cNvPicPr>
+          <p:nvPr/>
+        </p:nvPicPr>
+        <p:blipFill>
+          <a:blip r:embed="rId7">
+            <a:extLst>
+              <a:ext uri="{28A0092B-C50C-407E-A947-70E740481C1C}">
+                <a14:useLocalDpi xmlns:a14="http://schemas.microsoft.com/office/drawing/2010/main" val="0"/>
+              </a:ext>
+            </a:extLst>
+          </a:blip>
+          <a:stretch>
+            <a:fillRect/>
+          </a:stretch>
+        </p:blipFill>
+        <p:spPr>
+          <a:xfrm>
+            <a:off x="5259821" y="4922609"/>
+            <a:ext cx="2602946" cy="384731"/>
+          </a:xfrm>
+          <a:prstGeom prst="rect">
+            <a:avLst/>
+          </a:prstGeom>
+          <a:ln w="31750">
+            <a:solidFill>
+              <a:srgbClr val="FF0000"/>
+            </a:solidFill>
+          </a:ln>
+        </p:spPr>
+      </p:pic>
+      <p:pic>
+        <p:nvPicPr>
+          <p:cNvPr id="20" name="図 19">
+            <a:extLst>
+              <a:ext uri="{FF2B5EF4-FFF2-40B4-BE49-F238E27FC236}">
+                <a16:creationId xmlns:a16="http://schemas.microsoft.com/office/drawing/2014/main" id="{97EA411C-EA45-4ADE-A282-FD42A884821A}"/>
+              </a:ext>
+            </a:extLst>
+          </p:cNvPr>
+          <p:cNvPicPr>
+            <a:picLocks noChangeAspect="1"/>
+          </p:cNvPicPr>
+          <p:nvPr/>
+        </p:nvPicPr>
+        <p:blipFill>
+          <a:blip r:embed="rId8">
+            <a:extLst>
+              <a:ext uri="{28A0092B-C50C-407E-A947-70E740481C1C}">
+                <a14:useLocalDpi xmlns:a14="http://schemas.microsoft.com/office/drawing/2010/main" val="0"/>
+              </a:ext>
+            </a:extLst>
+          </a:blip>
+          <a:stretch>
+            <a:fillRect/>
+          </a:stretch>
+        </p:blipFill>
+        <p:spPr>
+          <a:xfrm>
+            <a:off x="5081394" y="5479997"/>
+            <a:ext cx="2781373" cy="419111"/>
+          </a:xfrm>
+          <a:prstGeom prst="rect">
+            <a:avLst/>
+          </a:prstGeom>
+          <a:ln w="31750">
+            <a:solidFill>
+              <a:srgbClr val="FF0000"/>
+            </a:solidFill>
+          </a:ln>
+        </p:spPr>
+      </p:pic>
+      <p:pic>
+        <p:nvPicPr>
+          <p:cNvPr id="22" name="図 21">
+            <a:extLst>
+              <a:ext uri="{FF2B5EF4-FFF2-40B4-BE49-F238E27FC236}">
+                <a16:creationId xmlns:a16="http://schemas.microsoft.com/office/drawing/2014/main" id="{E1138DD3-E5C2-4B9E-A1E6-AB53C4C9115E}"/>
+              </a:ext>
+            </a:extLst>
+          </p:cNvPr>
+          <p:cNvPicPr>
+            <a:picLocks noChangeAspect="1"/>
+          </p:cNvPicPr>
+          <p:nvPr/>
+        </p:nvPicPr>
+        <p:blipFill>
+          <a:blip r:embed="rId9">
+            <a:extLst>
+              <a:ext uri="{28A0092B-C50C-407E-A947-70E740481C1C}">
+                <a14:useLocalDpi xmlns:a14="http://schemas.microsoft.com/office/drawing/2010/main" val="0"/>
+              </a:ext>
+            </a:extLst>
+          </a:blip>
+          <a:stretch>
+            <a:fillRect/>
+          </a:stretch>
+        </p:blipFill>
+        <p:spPr>
+          <a:xfrm>
+            <a:off x="5123419" y="6058591"/>
+            <a:ext cx="2786816" cy="462655"/>
+          </a:xfrm>
+          <a:prstGeom prst="rect">
+            <a:avLst/>
+          </a:prstGeom>
+          <a:ln w="31750">
+            <a:solidFill>
+              <a:srgbClr val="FF0000"/>
+            </a:solidFill>
+          </a:ln>
+        </p:spPr>
+      </p:pic>
     </p:spTree>
     <p:extLst>
       <p:ext uri="{BB962C8B-B14F-4D97-AF65-F5344CB8AC3E}">
@@ -16651,7 +16897,7 @@
                             </p:stCondLst>
                             <p:childTnLst>
                               <p:par>
-                                <p:cTn id="10" presetID="16" presetClass="entr" presetSubtype="21" fill="hold" grpId="0" nodeType="clickEffect">
+                                <p:cTn id="10" presetID="10" presetClass="entr" presetSubtype="0" fill="hold" nodeType="clickEffect">
                                   <p:stCondLst>
                                     <p:cond delay="0"/>
                                   </p:stCondLst>
@@ -16664,7 +16910,7 @@
                                           </p:stCondLst>
                                         </p:cTn>
                                         <p:tgtEl>
-                                          <p:spTgt spid="7"/>
+                                          <p:spTgt spid="9"/>
                                         </p:tgtEl>
                                         <p:attrNameLst>
                                           <p:attrName>style.visibility</p:attrName>
@@ -16674,11 +16920,11 @@
                                         <p:strVal val="visible"/>
                                       </p:to>
                                     </p:set>
-                                    <p:animEffect transition="in" filter="barn(inVertical)">
+                                    <p:animEffect transition="in" filter="fade">
                                       <p:cBhvr>
                                         <p:cTn id="12" dur="500"/>
                                         <p:tgtEl>
-                                          <p:spTgt spid="7"/>
+                                          <p:spTgt spid="9"/>
                                         </p:tgtEl>
                                       </p:cBhvr>
                                     </p:animEffect>
@@ -16717,7 +16963,7 @@
                                           </p:stCondLst>
                                         </p:cTn>
                                         <p:tgtEl>
-                                          <p:spTgt spid="15"/>
+                                          <p:spTgt spid="7"/>
                                         </p:tgtEl>
                                         <p:attrNameLst>
                                           <p:attrName>style.visibility</p:attrName>
@@ -16731,7 +16977,7 @@
                                       <p:cBhvr>
                                         <p:cTn id="17" dur="500"/>
                                         <p:tgtEl>
-                                          <p:spTgt spid="15"/>
+                                          <p:spTgt spid="7"/>
                                         </p:tgtEl>
                                       </p:cBhvr>
                                     </p:animEffect>
@@ -16757,7 +17003,7 @@
                             </p:stCondLst>
                             <p:childTnLst>
                               <p:par>
-                                <p:cTn id="20" presetID="16" presetClass="entr" presetSubtype="21" fill="hold" grpId="0" nodeType="clickEffect">
+                                <p:cTn id="20" presetID="10" presetClass="entr" presetSubtype="0" fill="hold" nodeType="clickEffect">
                                   <p:stCondLst>
                                     <p:cond delay="0"/>
                                   </p:stCondLst>
@@ -16770,7 +17016,7 @@
                                           </p:stCondLst>
                                         </p:cTn>
                                         <p:tgtEl>
-                                          <p:spTgt spid="13"/>
+                                          <p:spTgt spid="11"/>
                                         </p:tgtEl>
                                         <p:attrNameLst>
                                           <p:attrName>style.visibility</p:attrName>
@@ -16780,11 +17026,11 @@
                                         <p:strVal val="visible"/>
                                       </p:to>
                                     </p:set>
-                                    <p:animEffect transition="in" filter="barn(inVertical)">
+                                    <p:animEffect transition="in" filter="fade">
                                       <p:cBhvr>
                                         <p:cTn id="22" dur="500"/>
                                         <p:tgtEl>
-                                          <p:spTgt spid="13"/>
+                                          <p:spTgt spid="11"/>
                                         </p:tgtEl>
                                       </p:cBhvr>
                                     </p:animEffect>
@@ -16823,7 +17069,7 @@
                                           </p:stCondLst>
                                         </p:cTn>
                                         <p:tgtEl>
-                                          <p:spTgt spid="12"/>
+                                          <p:spTgt spid="15"/>
                                         </p:tgtEl>
                                         <p:attrNameLst>
                                           <p:attrName>style.visibility</p:attrName>
@@ -16837,7 +17083,7 @@
                                       <p:cBhvr>
                                         <p:cTn id="27" dur="500"/>
                                         <p:tgtEl>
-                                          <p:spTgt spid="12"/>
+                                          <p:spTgt spid="15"/>
                                         </p:tgtEl>
                                       </p:cBhvr>
                                     </p:animEffect>
@@ -16863,7 +17109,7 @@
                             </p:stCondLst>
                             <p:childTnLst>
                               <p:par>
-                                <p:cTn id="30" presetID="16" presetClass="entr" presetSubtype="21" fill="hold" grpId="0" nodeType="clickEffect">
+                                <p:cTn id="30" presetID="10" presetClass="entr" presetSubtype="0" fill="hold" nodeType="clickEffect">
                                   <p:stCondLst>
                                     <p:cond delay="0"/>
                                   </p:stCondLst>
@@ -16871,6 +17117,271 @@
                                     <p:set>
                                       <p:cBhvr>
                                         <p:cTn id="31" dur="1" fill="hold">
+                                          <p:stCondLst>
+                                            <p:cond delay="0"/>
+                                          </p:stCondLst>
+                                        </p:cTn>
+                                        <p:tgtEl>
+                                          <p:spTgt spid="16"/>
+                                        </p:tgtEl>
+                                        <p:attrNameLst>
+                                          <p:attrName>style.visibility</p:attrName>
+                                        </p:attrNameLst>
+                                      </p:cBhvr>
+                                      <p:to>
+                                        <p:strVal val="visible"/>
+                                      </p:to>
+                                    </p:set>
+                                    <p:animEffect transition="in" filter="fade">
+                                      <p:cBhvr>
+                                        <p:cTn id="32" dur="500"/>
+                                        <p:tgtEl>
+                                          <p:spTgt spid="16"/>
+                                        </p:tgtEl>
+                                      </p:cBhvr>
+                                    </p:animEffect>
+                                  </p:childTnLst>
+                                </p:cTn>
+                              </p:par>
+                            </p:childTnLst>
+                          </p:cTn>
+                        </p:par>
+                      </p:childTnLst>
+                    </p:cTn>
+                  </p:par>
+                  <p:par>
+                    <p:cTn id="33" fill="hold">
+                      <p:stCondLst>
+                        <p:cond delay="indefinite"/>
+                      </p:stCondLst>
+                      <p:childTnLst>
+                        <p:par>
+                          <p:cTn id="34" fill="hold">
+                            <p:stCondLst>
+                              <p:cond delay="0"/>
+                            </p:stCondLst>
+                            <p:childTnLst>
+                              <p:par>
+                                <p:cTn id="35" presetID="16" presetClass="entr" presetSubtype="21" fill="hold" grpId="0" nodeType="clickEffect">
+                                  <p:stCondLst>
+                                    <p:cond delay="0"/>
+                                  </p:stCondLst>
+                                  <p:childTnLst>
+                                    <p:set>
+                                      <p:cBhvr>
+                                        <p:cTn id="36" dur="1" fill="hold">
+                                          <p:stCondLst>
+                                            <p:cond delay="0"/>
+                                          </p:stCondLst>
+                                        </p:cTn>
+                                        <p:tgtEl>
+                                          <p:spTgt spid="13"/>
+                                        </p:tgtEl>
+                                        <p:attrNameLst>
+                                          <p:attrName>style.visibility</p:attrName>
+                                        </p:attrNameLst>
+                                      </p:cBhvr>
+                                      <p:to>
+                                        <p:strVal val="visible"/>
+                                      </p:to>
+                                    </p:set>
+                                    <p:animEffect transition="in" filter="barn(inVertical)">
+                                      <p:cBhvr>
+                                        <p:cTn id="37" dur="500"/>
+                                        <p:tgtEl>
+                                          <p:spTgt spid="13"/>
+                                        </p:tgtEl>
+                                      </p:cBhvr>
+                                    </p:animEffect>
+                                  </p:childTnLst>
+                                </p:cTn>
+                              </p:par>
+                            </p:childTnLst>
+                          </p:cTn>
+                        </p:par>
+                      </p:childTnLst>
+                    </p:cTn>
+                  </p:par>
+                  <p:par>
+                    <p:cTn id="38" fill="hold">
+                      <p:stCondLst>
+                        <p:cond delay="indefinite"/>
+                      </p:stCondLst>
+                      <p:childTnLst>
+                        <p:par>
+                          <p:cTn id="39" fill="hold">
+                            <p:stCondLst>
+                              <p:cond delay="0"/>
+                            </p:stCondLst>
+                            <p:childTnLst>
+                              <p:par>
+                                <p:cTn id="40" presetID="10" presetClass="entr" presetSubtype="0" fill="hold" nodeType="clickEffect">
+                                  <p:stCondLst>
+                                    <p:cond delay="0"/>
+                                  </p:stCondLst>
+                                  <p:childTnLst>
+                                    <p:set>
+                                      <p:cBhvr>
+                                        <p:cTn id="41" dur="1" fill="hold">
+                                          <p:stCondLst>
+                                            <p:cond delay="0"/>
+                                          </p:stCondLst>
+                                        </p:cTn>
+                                        <p:tgtEl>
+                                          <p:spTgt spid="18"/>
+                                        </p:tgtEl>
+                                        <p:attrNameLst>
+                                          <p:attrName>style.visibility</p:attrName>
+                                        </p:attrNameLst>
+                                      </p:cBhvr>
+                                      <p:to>
+                                        <p:strVal val="visible"/>
+                                      </p:to>
+                                    </p:set>
+                                    <p:animEffect transition="in" filter="fade">
+                                      <p:cBhvr>
+                                        <p:cTn id="42" dur="500"/>
+                                        <p:tgtEl>
+                                          <p:spTgt spid="18"/>
+                                        </p:tgtEl>
+                                      </p:cBhvr>
+                                    </p:animEffect>
+                                  </p:childTnLst>
+                                </p:cTn>
+                              </p:par>
+                            </p:childTnLst>
+                          </p:cTn>
+                        </p:par>
+                      </p:childTnLst>
+                    </p:cTn>
+                  </p:par>
+                  <p:par>
+                    <p:cTn id="43" fill="hold">
+                      <p:stCondLst>
+                        <p:cond delay="indefinite"/>
+                      </p:stCondLst>
+                      <p:childTnLst>
+                        <p:par>
+                          <p:cTn id="44" fill="hold">
+                            <p:stCondLst>
+                              <p:cond delay="0"/>
+                            </p:stCondLst>
+                            <p:childTnLst>
+                              <p:par>
+                                <p:cTn id="45" presetID="16" presetClass="entr" presetSubtype="21" fill="hold" grpId="0" nodeType="clickEffect">
+                                  <p:stCondLst>
+                                    <p:cond delay="0"/>
+                                  </p:stCondLst>
+                                  <p:childTnLst>
+                                    <p:set>
+                                      <p:cBhvr>
+                                        <p:cTn id="46" dur="1" fill="hold">
+                                          <p:stCondLst>
+                                            <p:cond delay="0"/>
+                                          </p:stCondLst>
+                                        </p:cTn>
+                                        <p:tgtEl>
+                                          <p:spTgt spid="12"/>
+                                        </p:tgtEl>
+                                        <p:attrNameLst>
+                                          <p:attrName>style.visibility</p:attrName>
+                                        </p:attrNameLst>
+                                      </p:cBhvr>
+                                      <p:to>
+                                        <p:strVal val="visible"/>
+                                      </p:to>
+                                    </p:set>
+                                    <p:animEffect transition="in" filter="barn(inVertical)">
+                                      <p:cBhvr>
+                                        <p:cTn id="47" dur="500"/>
+                                        <p:tgtEl>
+                                          <p:spTgt spid="12"/>
+                                        </p:tgtEl>
+                                      </p:cBhvr>
+                                    </p:animEffect>
+                                  </p:childTnLst>
+                                </p:cTn>
+                              </p:par>
+                            </p:childTnLst>
+                          </p:cTn>
+                        </p:par>
+                      </p:childTnLst>
+                    </p:cTn>
+                  </p:par>
+                  <p:par>
+                    <p:cTn id="48" fill="hold">
+                      <p:stCondLst>
+                        <p:cond delay="indefinite"/>
+                      </p:stCondLst>
+                      <p:childTnLst>
+                        <p:par>
+                          <p:cTn id="49" fill="hold">
+                            <p:stCondLst>
+                              <p:cond delay="0"/>
+                            </p:stCondLst>
+                            <p:childTnLst>
+                              <p:par>
+                                <p:cTn id="50" presetID="10" presetClass="entr" presetSubtype="0" fill="hold" nodeType="clickEffect">
+                                  <p:stCondLst>
+                                    <p:cond delay="0"/>
+                                  </p:stCondLst>
+                                  <p:childTnLst>
+                                    <p:set>
+                                      <p:cBhvr>
+                                        <p:cTn id="51" dur="1" fill="hold">
+                                          <p:stCondLst>
+                                            <p:cond delay="0"/>
+                                          </p:stCondLst>
+                                        </p:cTn>
+                                        <p:tgtEl>
+                                          <p:spTgt spid="20"/>
+                                        </p:tgtEl>
+                                        <p:attrNameLst>
+                                          <p:attrName>style.visibility</p:attrName>
+                                        </p:attrNameLst>
+                                      </p:cBhvr>
+                                      <p:to>
+                                        <p:strVal val="visible"/>
+                                      </p:to>
+                                    </p:set>
+                                    <p:animEffect transition="in" filter="fade">
+                                      <p:cBhvr>
+                                        <p:cTn id="52" dur="500"/>
+                                        <p:tgtEl>
+                                          <p:spTgt spid="20"/>
+                                        </p:tgtEl>
+                                      </p:cBhvr>
+                                    </p:animEffect>
+                                  </p:childTnLst>
+                                </p:cTn>
+                              </p:par>
+                            </p:childTnLst>
+                          </p:cTn>
+                        </p:par>
+                      </p:childTnLst>
+                    </p:cTn>
+                  </p:par>
+                  <p:par>
+                    <p:cTn id="53" fill="hold">
+                      <p:stCondLst>
+                        <p:cond delay="indefinite"/>
+                      </p:stCondLst>
+                      <p:childTnLst>
+                        <p:par>
+                          <p:cTn id="54" fill="hold">
+                            <p:stCondLst>
+                              <p:cond delay="0"/>
+                            </p:stCondLst>
+                            <p:childTnLst>
+                              <p:par>
+                                <p:cTn id="55" presetID="16" presetClass="entr" presetSubtype="21" fill="hold" grpId="0" nodeType="clickEffect">
+                                  <p:stCondLst>
+                                    <p:cond delay="0"/>
+                                  </p:stCondLst>
+                                  <p:childTnLst>
+                                    <p:set>
+                                      <p:cBhvr>
+                                        <p:cTn id="56" dur="1" fill="hold">
                                           <p:stCondLst>
                                             <p:cond delay="0"/>
                                           </p:stCondLst>
@@ -16888,9 +17399,62 @@
                                     </p:set>
                                     <p:animEffect transition="in" filter="barn(inVertical)">
                                       <p:cBhvr>
-                                        <p:cTn id="32" dur="500"/>
+                                        <p:cTn id="57" dur="500"/>
                                         <p:tgtEl>
                                           <p:spTgt spid="8"/>
+                                        </p:tgtEl>
+                                      </p:cBhvr>
+                                    </p:animEffect>
+                                  </p:childTnLst>
+                                </p:cTn>
+                              </p:par>
+                            </p:childTnLst>
+                          </p:cTn>
+                        </p:par>
+                      </p:childTnLst>
+                    </p:cTn>
+                  </p:par>
+                  <p:par>
+                    <p:cTn id="58" fill="hold">
+                      <p:stCondLst>
+                        <p:cond delay="indefinite"/>
+                      </p:stCondLst>
+                      <p:childTnLst>
+                        <p:par>
+                          <p:cTn id="59" fill="hold">
+                            <p:stCondLst>
+                              <p:cond delay="0"/>
+                            </p:stCondLst>
+                            <p:childTnLst>
+                              <p:par>
+                                <p:cTn id="60" presetID="10" presetClass="entr" presetSubtype="0" fill="hold" nodeType="clickEffect">
+                                  <p:stCondLst>
+                                    <p:cond delay="0"/>
+                                  </p:stCondLst>
+                                  <p:childTnLst>
+                                    <p:set>
+                                      <p:cBhvr>
+                                        <p:cTn id="61" dur="1" fill="hold">
+                                          <p:stCondLst>
+                                            <p:cond delay="0"/>
+                                          </p:stCondLst>
+                                        </p:cTn>
+                                        <p:tgtEl>
+                                          <p:spTgt spid="22"/>
+                                        </p:tgtEl>
+                                        <p:attrNameLst>
+                                          <p:attrName>style.visibility</p:attrName>
+                                        </p:attrNameLst>
+                                      </p:cBhvr>
+                                      <p:to>
+                                        <p:strVal val="visible"/>
+                                      </p:to>
+                                    </p:set>
+                                    <p:animEffect transition="in" filter="fade">
+                                      <p:cBhvr>
+                                        <p:cTn id="62" dur="500"/>
+                                        <p:tgtEl>
+                                          <p:spTgt spid="22"/>
                                         </p:tgtEl>
                                       </p:cBhvr>
                                     </p:animEffect>
@@ -17013,7 +17577,7 @@
         </p:blipFill>
         <p:spPr>
           <a:xfrm>
-            <a:off x="484401" y="849535"/>
+            <a:off x="453390" y="850257"/>
             <a:ext cx="7424422" cy="5738844"/>
           </a:xfrm>
           <a:prstGeom prst="rect">
@@ -17172,14 +17736,14 @@
         </p:nvSpPr>
         <p:spPr>
           <a:xfrm>
-            <a:off x="3310021" y="1780674"/>
-            <a:ext cx="1106905" cy="315495"/>
+            <a:off x="2514601" y="1780674"/>
+            <a:ext cx="1902326" cy="315495"/>
           </a:xfrm>
           <a:prstGeom prst="ellipse">
             <a:avLst/>
           </a:prstGeom>
           <a:noFill/>
-          <a:ln>
+          <a:ln w="34925">
             <a:solidFill>
               <a:srgbClr val="FF0000"/>
             </a:solidFill>
@@ -17224,14 +17788,14 @@
         </p:nvSpPr>
         <p:spPr>
           <a:xfrm>
-            <a:off x="3310021" y="2868838"/>
-            <a:ext cx="1106905" cy="315495"/>
+            <a:off x="2548516" y="2868838"/>
+            <a:ext cx="2113051" cy="315495"/>
           </a:xfrm>
           <a:prstGeom prst="ellipse">
             <a:avLst/>
           </a:prstGeom>
           <a:noFill/>
-          <a:ln>
+          <a:ln w="31750">
             <a:solidFill>
               <a:srgbClr val="FF0000"/>
             </a:solidFill>
@@ -17276,14 +17840,14 @@
         </p:nvSpPr>
         <p:spPr>
           <a:xfrm>
-            <a:off x="3360821" y="5213659"/>
-            <a:ext cx="1106905" cy="315495"/>
+            <a:off x="2548517" y="5213659"/>
+            <a:ext cx="1919210" cy="315495"/>
           </a:xfrm>
           <a:prstGeom prst="ellipse">
             <a:avLst/>
           </a:prstGeom>
           <a:noFill/>
-          <a:ln>
+          <a:ln w="34925">
             <a:solidFill>
               <a:srgbClr val="FF0000"/>
             </a:solidFill>
@@ -17335,7 +17899,7 @@
             <a:avLst/>
           </a:prstGeom>
           <a:noFill/>
-          <a:ln>
+          <a:ln w="34925">
             <a:solidFill>
               <a:srgbClr val="FF0000"/>
             </a:solidFill>
@@ -17380,14 +17944,14 @@
         </p:nvSpPr>
         <p:spPr>
           <a:xfrm>
-            <a:off x="3732463" y="6331431"/>
-            <a:ext cx="1596190" cy="315495"/>
+            <a:off x="3360821" y="6410876"/>
+            <a:ext cx="1967832" cy="256948"/>
           </a:xfrm>
           <a:prstGeom prst="ellipse">
             <a:avLst/>
           </a:prstGeom>
           <a:noFill/>
-          <a:ln>
+          <a:ln w="34925">
             <a:solidFill>
               <a:srgbClr val="FF0000"/>
             </a:solidFill>
@@ -17432,14 +17996,14 @@
         </p:nvSpPr>
         <p:spPr>
           <a:xfrm>
-            <a:off x="3065378" y="4684047"/>
-            <a:ext cx="1596190" cy="315495"/>
+            <a:off x="2548516" y="4684047"/>
+            <a:ext cx="2113052" cy="315495"/>
           </a:xfrm>
           <a:prstGeom prst="ellipse">
             <a:avLst/>
           </a:prstGeom>
           <a:noFill/>
-          <a:ln>
+          <a:ln w="31750">
             <a:solidFill>
               <a:srgbClr val="FF0000"/>
             </a:solidFill>
@@ -17470,6 +18034,252 @@
           </a:p>
         </p:txBody>
       </p:sp>
+      <p:pic>
+        <p:nvPicPr>
+          <p:cNvPr id="4" name="図 3">
+            <a:extLst>
+              <a:ext uri="{FF2B5EF4-FFF2-40B4-BE49-F238E27FC236}">
+                <a16:creationId xmlns:a16="http://schemas.microsoft.com/office/drawing/2014/main" id="{84D9DBAC-C970-4AE6-BAFD-EED93183378A}"/>
+              </a:ext>
+            </a:extLst>
+          </p:cNvPr>
+          <p:cNvPicPr>
+            <a:picLocks noChangeAspect="1"/>
+          </p:cNvPicPr>
+          <p:nvPr/>
+        </p:nvPicPr>
+        <p:blipFill>
+          <a:blip r:embed="rId4">
+            <a:extLst>
+              <a:ext uri="{28A0092B-C50C-407E-A947-70E740481C1C}">
+                <a14:useLocalDpi xmlns:a14="http://schemas.microsoft.com/office/drawing/2010/main" val="0"/>
+              </a:ext>
+            </a:extLst>
+          </a:blip>
+          <a:stretch>
+            <a:fillRect/>
+          </a:stretch>
+        </p:blipFill>
+        <p:spPr>
+          <a:xfrm>
+            <a:off x="2231736" y="1754564"/>
+            <a:ext cx="3655550" cy="379094"/>
+          </a:xfrm>
+          <a:prstGeom prst="rect">
+            <a:avLst/>
+          </a:prstGeom>
+          <a:ln w="34925">
+            <a:solidFill>
+              <a:srgbClr val="FF0000"/>
+            </a:solidFill>
+          </a:ln>
+        </p:spPr>
+      </p:pic>
+      <p:pic>
+        <p:nvPicPr>
+          <p:cNvPr id="12" name="図 11">
+            <a:extLst>
+              <a:ext uri="{FF2B5EF4-FFF2-40B4-BE49-F238E27FC236}">
+                <a16:creationId xmlns:a16="http://schemas.microsoft.com/office/drawing/2014/main" id="{BEDF859A-9E35-4C7A-89ED-3F86A09952A1}"/>
+              </a:ext>
+            </a:extLst>
+          </p:cNvPr>
+          <p:cNvPicPr>
+            <a:picLocks noChangeAspect="1"/>
+          </p:cNvPicPr>
+          <p:nvPr/>
+        </p:nvPicPr>
+        <p:blipFill>
+          <a:blip r:embed="rId5">
+            <a:extLst>
+              <a:ext uri="{28A0092B-C50C-407E-A947-70E740481C1C}">
+                <a14:useLocalDpi xmlns:a14="http://schemas.microsoft.com/office/drawing/2010/main" val="0"/>
+              </a:ext>
+            </a:extLst>
+          </a:blip>
+          <a:stretch>
+            <a:fillRect/>
+          </a:stretch>
+        </p:blipFill>
+        <p:spPr>
+          <a:xfrm>
+            <a:off x="2210280" y="2863402"/>
+            <a:ext cx="3603266" cy="326580"/>
+          </a:xfrm>
+          <a:prstGeom prst="rect">
+            <a:avLst/>
+          </a:prstGeom>
+          <a:ln w="34925">
+            <a:solidFill>
+              <a:srgbClr val="FF0000"/>
+            </a:solidFill>
+          </a:ln>
+        </p:spPr>
+      </p:pic>
+      <p:pic>
+        <p:nvPicPr>
+          <p:cNvPr id="15" name="図 14">
+            <a:extLst>
+              <a:ext uri="{FF2B5EF4-FFF2-40B4-BE49-F238E27FC236}">
+                <a16:creationId xmlns:a16="http://schemas.microsoft.com/office/drawing/2014/main" id="{EBC0684F-4107-48E7-B706-10327E2F2647}"/>
+              </a:ext>
+            </a:extLst>
+          </p:cNvPr>
+          <p:cNvPicPr>
+            <a:picLocks noChangeAspect="1"/>
+          </p:cNvPicPr>
+          <p:nvPr/>
+        </p:nvPicPr>
+        <p:blipFill>
+          <a:blip r:embed="rId6">
+            <a:extLst>
+              <a:ext uri="{28A0092B-C50C-407E-A947-70E740481C1C}">
+                <a14:useLocalDpi xmlns:a14="http://schemas.microsoft.com/office/drawing/2010/main" val="0"/>
+              </a:ext>
+            </a:extLst>
+          </a:blip>
+          <a:stretch>
+            <a:fillRect/>
+          </a:stretch>
+        </p:blipFill>
+        <p:spPr>
+          <a:xfrm>
+            <a:off x="2117749" y="4684820"/>
+            <a:ext cx="3788328" cy="266707"/>
+          </a:xfrm>
+          <a:prstGeom prst="rect">
+            <a:avLst/>
+          </a:prstGeom>
+          <a:ln w="31750">
+            <a:solidFill>
+              <a:srgbClr val="FF0000"/>
+            </a:solidFill>
+          </a:ln>
+        </p:spPr>
+      </p:pic>
+      <p:pic>
+        <p:nvPicPr>
+          <p:cNvPr id="17" name="図 16">
+            <a:extLst>
+              <a:ext uri="{FF2B5EF4-FFF2-40B4-BE49-F238E27FC236}">
+                <a16:creationId xmlns:a16="http://schemas.microsoft.com/office/drawing/2014/main" id="{7A3019A2-3F32-4A59-90BD-D65BF4C73CEF}"/>
+              </a:ext>
+            </a:extLst>
+          </p:cNvPr>
+          <p:cNvPicPr>
+            <a:picLocks noChangeAspect="1"/>
+          </p:cNvPicPr>
+          <p:nvPr/>
+        </p:nvPicPr>
+        <p:blipFill>
+          <a:blip r:embed="rId7">
+            <a:extLst>
+              <a:ext uri="{28A0092B-C50C-407E-A947-70E740481C1C}">
+                <a14:useLocalDpi xmlns:a14="http://schemas.microsoft.com/office/drawing/2010/main" val="0"/>
+              </a:ext>
+            </a:extLst>
+          </a:blip>
+          <a:stretch>
+            <a:fillRect/>
+          </a:stretch>
+        </p:blipFill>
+        <p:spPr>
+          <a:xfrm>
+            <a:off x="2117749" y="5201793"/>
+            <a:ext cx="3396432" cy="299365"/>
+          </a:xfrm>
+          <a:prstGeom prst="rect">
+            <a:avLst/>
+          </a:prstGeom>
+          <a:ln w="34925">
+            <a:solidFill>
+              <a:srgbClr val="FF0000"/>
+            </a:solidFill>
+          </a:ln>
+        </p:spPr>
+      </p:pic>
+      <p:pic>
+        <p:nvPicPr>
+          <p:cNvPr id="22" name="図 21">
+            <a:extLst>
+              <a:ext uri="{FF2B5EF4-FFF2-40B4-BE49-F238E27FC236}">
+                <a16:creationId xmlns:a16="http://schemas.microsoft.com/office/drawing/2014/main" id="{912426A2-35AF-4EEC-967E-E3B928AACE7F}"/>
+              </a:ext>
+            </a:extLst>
+          </p:cNvPr>
+          <p:cNvPicPr>
+            <a:picLocks noChangeAspect="1"/>
+          </p:cNvPicPr>
+          <p:nvPr/>
+        </p:nvPicPr>
+        <p:blipFill>
+          <a:blip r:embed="rId8">
+            <a:extLst>
+              <a:ext uri="{28A0092B-C50C-407E-A947-70E740481C1C}">
+                <a14:useLocalDpi xmlns:a14="http://schemas.microsoft.com/office/drawing/2010/main" val="0"/>
+              </a:ext>
+            </a:extLst>
+          </a:blip>
+          <a:stretch>
+            <a:fillRect/>
+          </a:stretch>
+        </p:blipFill>
+        <p:spPr>
+          <a:xfrm>
+            <a:off x="2514601" y="5749153"/>
+            <a:ext cx="3908074" cy="277593"/>
+          </a:xfrm>
+          <a:prstGeom prst="rect">
+            <a:avLst/>
+          </a:prstGeom>
+          <a:ln w="34925">
+            <a:solidFill>
+              <a:srgbClr val="FF0000"/>
+            </a:solidFill>
+          </a:ln>
+        </p:spPr>
+      </p:pic>
+      <p:pic>
+        <p:nvPicPr>
+          <p:cNvPr id="24" name="図 23">
+            <a:extLst>
+              <a:ext uri="{FF2B5EF4-FFF2-40B4-BE49-F238E27FC236}">
+                <a16:creationId xmlns:a16="http://schemas.microsoft.com/office/drawing/2014/main" id="{4FA4B032-B574-490C-B522-60B8DC27A2C0}"/>
+              </a:ext>
+            </a:extLst>
+          </p:cNvPr>
+          <p:cNvPicPr>
+            <a:picLocks noChangeAspect="1"/>
+          </p:cNvPicPr>
+          <p:nvPr/>
+        </p:nvPicPr>
+        <p:blipFill>
+          <a:blip r:embed="rId9">
+            <a:extLst>
+              <a:ext uri="{28A0092B-C50C-407E-A947-70E740481C1C}">
+                <a14:useLocalDpi xmlns:a14="http://schemas.microsoft.com/office/drawing/2010/main" val="0"/>
+              </a:ext>
+            </a:extLst>
+          </a:blip>
+          <a:stretch>
+            <a:fillRect/>
+          </a:stretch>
+        </p:blipFill>
+        <p:spPr>
+          <a:xfrm>
+            <a:off x="2252426" y="6415933"/>
+            <a:ext cx="4430602" cy="228606"/>
+          </a:xfrm>
+          <a:prstGeom prst="rect">
+            <a:avLst/>
+          </a:prstGeom>
+          <a:ln w="34925">
+            <a:solidFill>
+              <a:srgbClr val="FF0000"/>
+            </a:solidFill>
+          </a:ln>
+        </p:spPr>
+      </p:pic>
     </p:spTree>
     <p:extLst>
       <p:ext uri="{BB962C8B-B14F-4D97-AF65-F5344CB8AC3E}">
@@ -17554,7 +18364,7 @@
                             </p:stCondLst>
                             <p:childTnLst>
                               <p:par>
-                                <p:cTn id="10" presetID="16" presetClass="entr" presetSubtype="21" fill="hold" grpId="0" nodeType="clickEffect">
+                                <p:cTn id="10" presetID="10" presetClass="entr" presetSubtype="0" fill="hold" nodeType="clickEffect">
                                   <p:stCondLst>
                                     <p:cond delay="0"/>
                                   </p:stCondLst>
@@ -17567,7 +18377,7 @@
                                           </p:stCondLst>
                                         </p:cTn>
                                         <p:tgtEl>
-                                          <p:spTgt spid="6"/>
+                                          <p:spTgt spid="4"/>
                                         </p:tgtEl>
                                         <p:attrNameLst>
                                           <p:attrName>style.visibility</p:attrName>
@@ -17577,11 +18387,11 @@
                                         <p:strVal val="visible"/>
                                       </p:to>
                                     </p:set>
-                                    <p:animEffect transition="in" filter="barn(inVertical)">
+                                    <p:animEffect transition="in" filter="fade">
                                       <p:cBhvr>
                                         <p:cTn id="12" dur="500"/>
                                         <p:tgtEl>
-                                          <p:spTgt spid="6"/>
+                                          <p:spTgt spid="4"/>
                                         </p:tgtEl>
                                       </p:cBhvr>
                                     </p:animEffect>
@@ -17620,7 +18430,7 @@
                                           </p:stCondLst>
                                         </p:cTn>
                                         <p:tgtEl>
-                                          <p:spTgt spid="7"/>
+                                          <p:spTgt spid="6"/>
                                         </p:tgtEl>
                                         <p:attrNameLst>
                                           <p:attrName>style.visibility</p:attrName>
@@ -17634,7 +18444,7 @@
                                       <p:cBhvr>
                                         <p:cTn id="17" dur="500"/>
                                         <p:tgtEl>
-                                          <p:spTgt spid="7"/>
+                                          <p:spTgt spid="6"/>
                                         </p:tgtEl>
                                       </p:cBhvr>
                                     </p:animEffect>
@@ -17660,7 +18470,7 @@
                             </p:stCondLst>
                             <p:childTnLst>
                               <p:par>
-                                <p:cTn id="20" presetID="16" presetClass="entr" presetSubtype="21" fill="hold" grpId="0" nodeType="clickEffect">
+                                <p:cTn id="20" presetID="10" presetClass="entr" presetSubtype="0" fill="hold" nodeType="clickEffect">
                                   <p:stCondLst>
                                     <p:cond delay="0"/>
                                   </p:stCondLst>
@@ -17673,7 +18483,7 @@
                                           </p:stCondLst>
                                         </p:cTn>
                                         <p:tgtEl>
-                                          <p:spTgt spid="8"/>
+                                          <p:spTgt spid="12"/>
                                         </p:tgtEl>
                                         <p:attrNameLst>
                                           <p:attrName>style.visibility</p:attrName>
@@ -17683,11 +18493,11 @@
                                         <p:strVal val="visible"/>
                                       </p:to>
                                     </p:set>
-                                    <p:animEffect transition="in" filter="barn(inVertical)">
+                                    <p:animEffect transition="in" filter="fade">
                                       <p:cBhvr>
                                         <p:cTn id="22" dur="500"/>
                                         <p:tgtEl>
-                                          <p:spTgt spid="8"/>
+                                          <p:spTgt spid="12"/>
                                         </p:tgtEl>
                                       </p:cBhvr>
                                     </p:animEffect>
@@ -17726,7 +18536,7 @@
                                           </p:stCondLst>
                                         </p:cTn>
                                         <p:tgtEl>
-                                          <p:spTgt spid="9"/>
+                                          <p:spTgt spid="7"/>
                                         </p:tgtEl>
                                         <p:attrNameLst>
                                           <p:attrName>style.visibility</p:attrName>
@@ -17740,7 +18550,7 @@
                                       <p:cBhvr>
                                         <p:cTn id="27" dur="500"/>
                                         <p:tgtEl>
-                                          <p:spTgt spid="9"/>
+                                          <p:spTgt spid="7"/>
                                         </p:tgtEl>
                                       </p:cBhvr>
                                     </p:animEffect>
@@ -17766,7 +18576,7 @@
                             </p:stCondLst>
                             <p:childTnLst>
                               <p:par>
-                                <p:cTn id="30" presetID="21" presetClass="entr" presetSubtype="1" fill="hold" grpId="0" nodeType="clickEffect">
+                                <p:cTn id="30" presetID="10" presetClass="entr" presetSubtype="0" fill="hold" nodeType="clickEffect">
                                   <p:stCondLst>
                                     <p:cond delay="0"/>
                                   </p:stCondLst>
@@ -17774,6 +18584,271 @@
                                     <p:set>
                                       <p:cBhvr>
                                         <p:cTn id="31" dur="1" fill="hold">
+                                          <p:stCondLst>
+                                            <p:cond delay="0"/>
+                                          </p:stCondLst>
+                                        </p:cTn>
+                                        <p:tgtEl>
+                                          <p:spTgt spid="17"/>
+                                        </p:tgtEl>
+                                        <p:attrNameLst>
+                                          <p:attrName>style.visibility</p:attrName>
+                                        </p:attrNameLst>
+                                      </p:cBhvr>
+                                      <p:to>
+                                        <p:strVal val="visible"/>
+                                      </p:to>
+                                    </p:set>
+                                    <p:animEffect transition="in" filter="fade">
+                                      <p:cBhvr>
+                                        <p:cTn id="32" dur="500"/>
+                                        <p:tgtEl>
+                                          <p:spTgt spid="17"/>
+                                        </p:tgtEl>
+                                      </p:cBhvr>
+                                    </p:animEffect>
+                                  </p:childTnLst>
+                                </p:cTn>
+                              </p:par>
+                            </p:childTnLst>
+                          </p:cTn>
+                        </p:par>
+                      </p:childTnLst>
+                    </p:cTn>
+                  </p:par>
+                  <p:par>
+                    <p:cTn id="33" fill="hold">
+                      <p:stCondLst>
+                        <p:cond delay="indefinite"/>
+                      </p:stCondLst>
+                      <p:childTnLst>
+                        <p:par>
+                          <p:cTn id="34" fill="hold">
+                            <p:stCondLst>
+                              <p:cond delay="0"/>
+                            </p:stCondLst>
+                            <p:childTnLst>
+                              <p:par>
+                                <p:cTn id="35" presetID="16" presetClass="entr" presetSubtype="21" fill="hold" grpId="0" nodeType="clickEffect">
+                                  <p:stCondLst>
+                                    <p:cond delay="0"/>
+                                  </p:stCondLst>
+                                  <p:childTnLst>
+                                    <p:set>
+                                      <p:cBhvr>
+                                        <p:cTn id="36" dur="1" fill="hold">
+                                          <p:stCondLst>
+                                            <p:cond delay="0"/>
+                                          </p:stCondLst>
+                                        </p:cTn>
+                                        <p:tgtEl>
+                                          <p:spTgt spid="8"/>
+                                        </p:tgtEl>
+                                        <p:attrNameLst>
+                                          <p:attrName>style.visibility</p:attrName>
+                                        </p:attrNameLst>
+                                      </p:cBhvr>
+                                      <p:to>
+                                        <p:strVal val="visible"/>
+                                      </p:to>
+                                    </p:set>
+                                    <p:animEffect transition="in" filter="barn(inVertical)">
+                                      <p:cBhvr>
+                                        <p:cTn id="37" dur="500"/>
+                                        <p:tgtEl>
+                                          <p:spTgt spid="8"/>
+                                        </p:tgtEl>
+                                      </p:cBhvr>
+                                    </p:animEffect>
+                                  </p:childTnLst>
+                                </p:cTn>
+                              </p:par>
+                            </p:childTnLst>
+                          </p:cTn>
+                        </p:par>
+                      </p:childTnLst>
+                    </p:cTn>
+                  </p:par>
+                  <p:par>
+                    <p:cTn id="38" fill="hold">
+                      <p:stCondLst>
+                        <p:cond delay="indefinite"/>
+                      </p:stCondLst>
+                      <p:childTnLst>
+                        <p:par>
+                          <p:cTn id="39" fill="hold">
+                            <p:stCondLst>
+                              <p:cond delay="0"/>
+                            </p:stCondLst>
+                            <p:childTnLst>
+                              <p:par>
+                                <p:cTn id="40" presetID="10" presetClass="entr" presetSubtype="0" fill="hold" nodeType="clickEffect">
+                                  <p:stCondLst>
+                                    <p:cond delay="0"/>
+                                  </p:stCondLst>
+                                  <p:childTnLst>
+                                    <p:set>
+                                      <p:cBhvr>
+                                        <p:cTn id="41" dur="1" fill="hold">
+                                          <p:stCondLst>
+                                            <p:cond delay="0"/>
+                                          </p:stCondLst>
+                                        </p:cTn>
+                                        <p:tgtEl>
+                                          <p:spTgt spid="22"/>
+                                        </p:tgtEl>
+                                        <p:attrNameLst>
+                                          <p:attrName>style.visibility</p:attrName>
+                                        </p:attrNameLst>
+                                      </p:cBhvr>
+                                      <p:to>
+                                        <p:strVal val="visible"/>
+                                      </p:to>
+                                    </p:set>
+                                    <p:animEffect transition="in" filter="fade">
+                                      <p:cBhvr>
+                                        <p:cTn id="42" dur="500"/>
+                                        <p:tgtEl>
+                                          <p:spTgt spid="22"/>
+                                        </p:tgtEl>
+                                      </p:cBhvr>
+                                    </p:animEffect>
+                                  </p:childTnLst>
+                                </p:cTn>
+                              </p:par>
+                            </p:childTnLst>
+                          </p:cTn>
+                        </p:par>
+                      </p:childTnLst>
+                    </p:cTn>
+                  </p:par>
+                  <p:par>
+                    <p:cTn id="43" fill="hold">
+                      <p:stCondLst>
+                        <p:cond delay="indefinite"/>
+                      </p:stCondLst>
+                      <p:childTnLst>
+                        <p:par>
+                          <p:cTn id="44" fill="hold">
+                            <p:stCondLst>
+                              <p:cond delay="0"/>
+                            </p:stCondLst>
+                            <p:childTnLst>
+                              <p:par>
+                                <p:cTn id="45" presetID="16" presetClass="entr" presetSubtype="21" fill="hold" grpId="0" nodeType="clickEffect">
+                                  <p:stCondLst>
+                                    <p:cond delay="0"/>
+                                  </p:stCondLst>
+                                  <p:childTnLst>
+                                    <p:set>
+                                      <p:cBhvr>
+                                        <p:cTn id="46" dur="1" fill="hold">
+                                          <p:stCondLst>
+                                            <p:cond delay="0"/>
+                                          </p:stCondLst>
+                                        </p:cTn>
+                                        <p:tgtEl>
+                                          <p:spTgt spid="9"/>
+                                        </p:tgtEl>
+                                        <p:attrNameLst>
+                                          <p:attrName>style.visibility</p:attrName>
+                                        </p:attrNameLst>
+                                      </p:cBhvr>
+                                      <p:to>
+                                        <p:strVal val="visible"/>
+                                      </p:to>
+                                    </p:set>
+                                    <p:animEffect transition="in" filter="barn(inVertical)">
+                                      <p:cBhvr>
+                                        <p:cTn id="47" dur="500"/>
+                                        <p:tgtEl>
+                                          <p:spTgt spid="9"/>
+                                        </p:tgtEl>
+                                      </p:cBhvr>
+                                    </p:animEffect>
+                                  </p:childTnLst>
+                                </p:cTn>
+                              </p:par>
+                            </p:childTnLst>
+                          </p:cTn>
+                        </p:par>
+                      </p:childTnLst>
+                    </p:cTn>
+                  </p:par>
+                  <p:par>
+                    <p:cTn id="48" fill="hold">
+                      <p:stCondLst>
+                        <p:cond delay="indefinite"/>
+                      </p:stCondLst>
+                      <p:childTnLst>
+                        <p:par>
+                          <p:cTn id="49" fill="hold">
+                            <p:stCondLst>
+                              <p:cond delay="0"/>
+                            </p:stCondLst>
+                            <p:childTnLst>
+                              <p:par>
+                                <p:cTn id="50" presetID="10" presetClass="entr" presetSubtype="0" fill="hold" nodeType="clickEffect">
+                                  <p:stCondLst>
+                                    <p:cond delay="0"/>
+                                  </p:stCondLst>
+                                  <p:childTnLst>
+                                    <p:set>
+                                      <p:cBhvr>
+                                        <p:cTn id="51" dur="1" fill="hold">
+                                          <p:stCondLst>
+                                            <p:cond delay="0"/>
+                                          </p:stCondLst>
+                                        </p:cTn>
+                                        <p:tgtEl>
+                                          <p:spTgt spid="24"/>
+                                        </p:tgtEl>
+                                        <p:attrNameLst>
+                                          <p:attrName>style.visibility</p:attrName>
+                                        </p:attrNameLst>
+                                      </p:cBhvr>
+                                      <p:to>
+                                        <p:strVal val="visible"/>
+                                      </p:to>
+                                    </p:set>
+                                    <p:animEffect transition="in" filter="fade">
+                                      <p:cBhvr>
+                                        <p:cTn id="52" dur="500"/>
+                                        <p:tgtEl>
+                                          <p:spTgt spid="24"/>
+                                        </p:tgtEl>
+                                      </p:cBhvr>
+                                    </p:animEffect>
+                                  </p:childTnLst>
+                                </p:cTn>
+                              </p:par>
+                            </p:childTnLst>
+                          </p:cTn>
+                        </p:par>
+                      </p:childTnLst>
+                    </p:cTn>
+                  </p:par>
+                  <p:par>
+                    <p:cTn id="53" fill="hold">
+                      <p:stCondLst>
+                        <p:cond delay="indefinite"/>
+                      </p:stCondLst>
+                      <p:childTnLst>
+                        <p:par>
+                          <p:cTn id="54" fill="hold">
+                            <p:stCondLst>
+                              <p:cond delay="0"/>
+                            </p:stCondLst>
+                            <p:childTnLst>
+                              <p:par>
+                                <p:cTn id="55" presetID="21" presetClass="entr" presetSubtype="1" fill="hold" grpId="0" nodeType="clickEffect">
+                                  <p:stCondLst>
+                                    <p:cond delay="0"/>
+                                  </p:stCondLst>
+                                  <p:childTnLst>
+                                    <p:set>
+                                      <p:cBhvr>
+                                        <p:cTn id="56" dur="1" fill="hold">
                                           <p:stCondLst>
                                             <p:cond delay="0"/>
                                           </p:stCondLst>
@@ -17791,9 +18866,62 @@
                                     </p:set>
                                     <p:animEffect transition="in" filter="wheel(1)">
                                       <p:cBhvr>
-                                        <p:cTn id="32" dur="2000"/>
+                                        <p:cTn id="57" dur="2000"/>
                                         <p:tgtEl>
                                           <p:spTgt spid="10"/>
+                                        </p:tgtEl>
+                                      </p:cBhvr>
+                                    </p:animEffect>
+                                  </p:childTnLst>
+                                </p:cTn>
+                              </p:par>
+                            </p:childTnLst>
+                          </p:cTn>
+                        </p:par>
+                      </p:childTnLst>
+                    </p:cTn>
+                  </p:par>
+                  <p:par>
+                    <p:cTn id="58" fill="hold">
+                      <p:stCondLst>
+                        <p:cond delay="indefinite"/>
+                      </p:stCondLst>
+                      <p:childTnLst>
+                        <p:par>
+                          <p:cTn id="59" fill="hold">
+                            <p:stCondLst>
+                              <p:cond delay="0"/>
+                            </p:stCondLst>
+                            <p:childTnLst>
+                              <p:par>
+                                <p:cTn id="60" presetID="10" presetClass="entr" presetSubtype="0" fill="hold" nodeType="clickEffect">
+                                  <p:stCondLst>
+                                    <p:cond delay="0"/>
+                                  </p:stCondLst>
+                                  <p:childTnLst>
+                                    <p:set>
+                                      <p:cBhvr>
+                                        <p:cTn id="61" dur="1" fill="hold">
+                                          <p:stCondLst>
+                                            <p:cond delay="0"/>
+                                          </p:stCondLst>
+                                        </p:cTn>
+                                        <p:tgtEl>
+                                          <p:spTgt spid="15"/>
+                                        </p:tgtEl>
+                                        <p:attrNameLst>
+                                          <p:attrName>style.visibility</p:attrName>
+                                        </p:attrNameLst>
+                                      </p:cBhvr>
+                                      <p:to>
+                                        <p:strVal val="visible"/>
+                                      </p:to>
+                                    </p:set>
+                                    <p:animEffect transition="in" filter="fade">
+                                      <p:cBhvr>
+                                        <p:cTn id="62" dur="500"/>
+                                        <p:tgtEl>
+                                          <p:spTgt spid="15"/>
                                         </p:tgtEl>
                                       </p:cBhvr>
                                     </p:animEffect>
@@ -20105,6 +21233,170 @@
           </a:prstGeom>
         </p:spPr>
       </p:pic>
+      <p:sp>
+        <p:nvSpPr>
+          <p:cNvPr id="3" name="矢印: ストライプ 2">
+            <a:extLst>
+              <a:ext uri="{FF2B5EF4-FFF2-40B4-BE49-F238E27FC236}">
+                <a16:creationId xmlns:a16="http://schemas.microsoft.com/office/drawing/2014/main" id="{C7CFE177-048F-4CD9-8C48-E49C572DF77C}"/>
+              </a:ext>
+            </a:extLst>
+          </p:cNvPr>
+          <p:cNvSpPr/>
+          <p:nvPr/>
+        </p:nvSpPr>
+        <p:spPr>
+          <a:xfrm rot="5400000">
+            <a:off x="4248545" y="3416214"/>
+            <a:ext cx="1174446" cy="222737"/>
+          </a:xfrm>
+          <a:prstGeom prst="stripedRightArrow">
+            <a:avLst/>
+          </a:prstGeom>
+        </p:spPr>
+        <p:style>
+          <a:lnRef idx="2">
+            <a:schemeClr val="accent1">
+              <a:shade val="50000"/>
+            </a:schemeClr>
+          </a:lnRef>
+          <a:fillRef idx="1">
+            <a:schemeClr val="accent1"/>
+          </a:fillRef>
+          <a:effectRef idx="0">
+            <a:schemeClr val="accent1"/>
+          </a:effectRef>
+          <a:fontRef idx="minor">
+            <a:schemeClr val="lt1"/>
+          </a:fontRef>
+        </p:style>
+        <p:txBody>
+          <a:bodyPr rtlCol="0" anchor="ctr"/>
+          <a:lstStyle/>
+          <a:p>
+            <a:pPr algn="ctr"/>
+            <a:endParaRPr kumimoji="1" lang="ja-JP" altLang="en-US"/>
+          </a:p>
+        </p:txBody>
+      </p:sp>
+      <p:sp>
+        <p:nvSpPr>
+          <p:cNvPr id="4" name="テキスト ボックス 3">
+            <a:extLst>
+              <a:ext uri="{FF2B5EF4-FFF2-40B4-BE49-F238E27FC236}">
+                <a16:creationId xmlns:a16="http://schemas.microsoft.com/office/drawing/2014/main" id="{70B97599-42F0-47A7-8911-B6DB04DF3ED3}"/>
+              </a:ext>
+            </a:extLst>
+          </p:cNvPr>
+          <p:cNvSpPr txBox="1"/>
+          <p:nvPr/>
+        </p:nvSpPr>
+        <p:spPr>
+          <a:xfrm>
+            <a:off x="4947137" y="3342916"/>
+            <a:ext cx="750277" cy="369332"/>
+          </a:xfrm>
+          <a:prstGeom prst="rect">
+            <a:avLst/>
+          </a:prstGeom>
+          <a:noFill/>
+        </p:spPr>
+        <p:txBody>
+          <a:bodyPr wrap="square" rtlCol="0">
+            <a:spAutoFit/>
+          </a:bodyPr>
+          <a:lstStyle/>
+          <a:p>
+            <a:r>
+              <a:rPr kumimoji="1" lang="en-US" altLang="ja-JP" dirty="0"/>
+              <a:t>Down</a:t>
+            </a:r>
+            <a:endParaRPr kumimoji="1" lang="ja-JP" altLang="en-US" dirty="0"/>
+          </a:p>
+        </p:txBody>
+      </p:sp>
+      <p:sp>
+        <p:nvSpPr>
+          <p:cNvPr id="6" name="矢印: 上 5">
+            <a:extLst>
+              <a:ext uri="{FF2B5EF4-FFF2-40B4-BE49-F238E27FC236}">
+                <a16:creationId xmlns:a16="http://schemas.microsoft.com/office/drawing/2014/main" id="{C7B2B59F-C534-44A0-BA41-E068805984BE}"/>
+              </a:ext>
+            </a:extLst>
+          </p:cNvPr>
+          <p:cNvSpPr/>
+          <p:nvPr/>
+        </p:nvSpPr>
+        <p:spPr>
+          <a:xfrm>
+            <a:off x="4640344" y="5074603"/>
+            <a:ext cx="390847" cy="181707"/>
+          </a:xfrm>
+          <a:prstGeom prst="upArrow">
+            <a:avLst/>
+          </a:prstGeom>
+        </p:spPr>
+        <p:style>
+          <a:lnRef idx="2">
+            <a:schemeClr val="accent1">
+              <a:shade val="50000"/>
+            </a:schemeClr>
+          </a:lnRef>
+          <a:fillRef idx="1">
+            <a:schemeClr val="accent1"/>
+          </a:fillRef>
+          <a:effectRef idx="0">
+            <a:schemeClr val="accent1"/>
+          </a:effectRef>
+          <a:fontRef idx="minor">
+            <a:schemeClr val="lt1"/>
+          </a:fontRef>
+        </p:style>
+        <p:txBody>
+          <a:bodyPr rtlCol="0" anchor="ctr"/>
+          <a:lstStyle/>
+          <a:p>
+            <a:pPr algn="ctr"/>
+            <a:endParaRPr kumimoji="1" lang="ja-JP" altLang="en-US"/>
+          </a:p>
+        </p:txBody>
+      </p:sp>
+      <p:sp>
+        <p:nvSpPr>
+          <p:cNvPr id="8" name="テキスト ボックス 7">
+            <a:extLst>
+              <a:ext uri="{FF2B5EF4-FFF2-40B4-BE49-F238E27FC236}">
+                <a16:creationId xmlns:a16="http://schemas.microsoft.com/office/drawing/2014/main" id="{05549C98-1F23-42CA-8ACA-A077C9E81749}"/>
+              </a:ext>
+            </a:extLst>
+          </p:cNvPr>
+          <p:cNvSpPr txBox="1"/>
+          <p:nvPr/>
+        </p:nvSpPr>
+        <p:spPr>
+          <a:xfrm>
+            <a:off x="5031191" y="4941277"/>
+            <a:ext cx="1187901" cy="369332"/>
+          </a:xfrm>
+          <a:prstGeom prst="rect">
+            <a:avLst/>
+          </a:prstGeom>
+          <a:noFill/>
+        </p:spPr>
+        <p:txBody>
+          <a:bodyPr wrap="square" rtlCol="0">
+            <a:spAutoFit/>
+          </a:bodyPr>
+          <a:lstStyle/>
+          <a:p>
+            <a:r>
+              <a:rPr kumimoji="1" lang="en-US" altLang="ja-JP" dirty="0"/>
+              <a:t>Slightly Up</a:t>
+            </a:r>
+            <a:endParaRPr kumimoji="1" lang="ja-JP" altLang="en-US" dirty="0"/>
+          </a:p>
+        </p:txBody>
+      </p:sp>
     </p:spTree>
     <p:extLst>
       <p:ext uri="{BB962C8B-B14F-4D97-AF65-F5344CB8AC3E}">
@@ -20115,6 +21407,780 @@
   <p:clrMapOvr>
     <a:masterClrMapping/>
   </p:clrMapOvr>
+  <p:timing>
+    <p:tnLst>
+      <p:par>
+        <p:cTn id="1" dur="indefinite" restart="never" nodeType="tmRoot">
+          <p:childTnLst>
+            <p:seq concurrent="1" nextAc="seek">
+              <p:cTn id="2" dur="indefinite" nodeType="mainSeq">
+                <p:childTnLst>
+                  <p:par>
+                    <p:cTn id="3" fill="hold">
+                      <p:stCondLst>
+                        <p:cond delay="indefinite"/>
+                      </p:stCondLst>
+                      <p:childTnLst>
+                        <p:par>
+                          <p:cTn id="4" fill="hold">
+                            <p:stCondLst>
+                              <p:cond delay="0"/>
+                            </p:stCondLst>
+                            <p:childTnLst>
+                              <p:par>
+                                <p:cTn id="5" presetID="26" presetClass="entr" presetSubtype="0" fill="hold" grpId="0" nodeType="clickEffect">
+                                  <p:stCondLst>
+                                    <p:cond delay="0"/>
+                                  </p:stCondLst>
+                                  <p:childTnLst>
+                                    <p:set>
+                                      <p:cBhvr>
+                                        <p:cTn id="6" dur="1" fill="hold">
+                                          <p:stCondLst>
+                                            <p:cond delay="0"/>
+                                          </p:stCondLst>
+                                        </p:cTn>
+                                        <p:tgtEl>
+                                          <p:spTgt spid="3"/>
+                                        </p:tgtEl>
+                                        <p:attrNameLst>
+                                          <p:attrName>style.visibility</p:attrName>
+                                        </p:attrNameLst>
+                                      </p:cBhvr>
+                                      <p:to>
+                                        <p:strVal val="visible"/>
+                                      </p:to>
+                                    </p:set>
+                                    <p:animEffect transition="in" filter="wipe(down)">
+                                      <p:cBhvr>
+                                        <p:cTn id="7" dur="580">
+                                          <p:stCondLst>
+                                            <p:cond delay="0"/>
+                                          </p:stCondLst>
+                                        </p:cTn>
+                                        <p:tgtEl>
+                                          <p:spTgt spid="3"/>
+                                        </p:tgtEl>
+                                      </p:cBhvr>
+                                    </p:animEffect>
+                                    <p:anim calcmode="lin" valueType="num">
+                                      <p:cBhvr>
+                                        <p:cTn id="8" dur="1822" tmFilter="0,0; 0.14,0.36; 0.43,0.73; 0.71,0.91; 1.0,1.0">
+                                          <p:stCondLst>
+                                            <p:cond delay="0"/>
+                                          </p:stCondLst>
+                                        </p:cTn>
+                                        <p:tgtEl>
+                                          <p:spTgt spid="3"/>
+                                        </p:tgtEl>
+                                        <p:attrNameLst>
+                                          <p:attrName>ppt_x</p:attrName>
+                                        </p:attrNameLst>
+                                      </p:cBhvr>
+                                      <p:tavLst>
+                                        <p:tav tm="0">
+                                          <p:val>
+                                            <p:strVal val="#ppt_x-0.25"/>
+                                          </p:val>
+                                        </p:tav>
+                                        <p:tav tm="100000">
+                                          <p:val>
+                                            <p:strVal val="#ppt_x"/>
+                                          </p:val>
+                                        </p:tav>
+                                      </p:tavLst>
+                                    </p:anim>
+                                    <p:anim calcmode="lin" valueType="num">
+                                      <p:cBhvr>
+                                        <p:cTn id="9" dur="664" tmFilter="0.0,0.0; 0.25,0.07; 0.50,0.2; 0.75,0.467; 1.0,1.0">
+                                          <p:stCondLst>
+                                            <p:cond delay="0"/>
+                                          </p:stCondLst>
+                                        </p:cTn>
+                                        <p:tgtEl>
+                                          <p:spTgt spid="3"/>
+                                        </p:tgtEl>
+                                        <p:attrNameLst>
+                                          <p:attrName>ppt_y</p:attrName>
+                                        </p:attrNameLst>
+                                      </p:cBhvr>
+                                      <p:tavLst>
+                                        <p:tav tm="0" fmla="#ppt_y-sin(pi*$)/3">
+                                          <p:val>
+                                            <p:fltVal val="0.5"/>
+                                          </p:val>
+                                        </p:tav>
+                                        <p:tav tm="100000">
+                                          <p:val>
+                                            <p:fltVal val="1"/>
+                                          </p:val>
+                                        </p:tav>
+                                      </p:tavLst>
+                                    </p:anim>
+                                    <p:anim calcmode="lin" valueType="num">
+                                      <p:cBhvr>
+                                        <p:cTn id="10" dur="664" tmFilter="0, 0; 0.125,0.2665; 0.25,0.4; 0.375,0.465; 0.5,0.5;  0.625,0.535; 0.75,0.6; 0.875,0.7335; 1,1">
+                                          <p:stCondLst>
+                                            <p:cond delay="664"/>
+                                          </p:stCondLst>
+                                        </p:cTn>
+                                        <p:tgtEl>
+                                          <p:spTgt spid="3"/>
+                                        </p:tgtEl>
+                                        <p:attrNameLst>
+                                          <p:attrName>ppt_y</p:attrName>
+                                        </p:attrNameLst>
+                                      </p:cBhvr>
+                                      <p:tavLst>
+                                        <p:tav tm="0" fmla="#ppt_y-sin(pi*$)/9">
+                                          <p:val>
+                                            <p:fltVal val="0"/>
+                                          </p:val>
+                                        </p:tav>
+                                        <p:tav tm="100000">
+                                          <p:val>
+                                            <p:fltVal val="1"/>
+                                          </p:val>
+                                        </p:tav>
+                                      </p:tavLst>
+                                    </p:anim>
+                                    <p:anim calcmode="lin" valueType="num">
+                                      <p:cBhvr>
+                                        <p:cTn id="11" dur="332" tmFilter="0, 0; 0.125,0.2665; 0.25,0.4; 0.375,0.465; 0.5,0.5;  0.625,0.535; 0.75,0.6; 0.875,0.7335; 1,1">
+                                          <p:stCondLst>
+                                            <p:cond delay="1324"/>
+                                          </p:stCondLst>
+                                        </p:cTn>
+                                        <p:tgtEl>
+                                          <p:spTgt spid="3"/>
+                                        </p:tgtEl>
+                                        <p:attrNameLst>
+                                          <p:attrName>ppt_y</p:attrName>
+                                        </p:attrNameLst>
+                                      </p:cBhvr>
+                                      <p:tavLst>
+                                        <p:tav tm="0" fmla="#ppt_y-sin(pi*$)/27">
+                                          <p:val>
+                                            <p:fltVal val="0"/>
+                                          </p:val>
+                                        </p:tav>
+                                        <p:tav tm="100000">
+                                          <p:val>
+                                            <p:fltVal val="1"/>
+                                          </p:val>
+                                        </p:tav>
+                                      </p:tavLst>
+                                    </p:anim>
+                                    <p:anim calcmode="lin" valueType="num">
+                                      <p:cBhvr>
+                                        <p:cTn id="12" dur="164" tmFilter="0, 0; 0.125,0.2665; 0.25,0.4; 0.375,0.465; 0.5,0.5;  0.625,0.535; 0.75,0.6; 0.875,0.7335; 1,1">
+                                          <p:stCondLst>
+                                            <p:cond delay="1656"/>
+                                          </p:stCondLst>
+                                        </p:cTn>
+                                        <p:tgtEl>
+                                          <p:spTgt spid="3"/>
+                                        </p:tgtEl>
+                                        <p:attrNameLst>
+                                          <p:attrName>ppt_y</p:attrName>
+                                        </p:attrNameLst>
+                                      </p:cBhvr>
+                                      <p:tavLst>
+                                        <p:tav tm="0" fmla="#ppt_y-sin(pi*$)/81">
+                                          <p:val>
+                                            <p:fltVal val="0"/>
+                                          </p:val>
+                                        </p:tav>
+                                        <p:tav tm="100000">
+                                          <p:val>
+                                            <p:fltVal val="1"/>
+                                          </p:val>
+                                        </p:tav>
+                                      </p:tavLst>
+                                    </p:anim>
+                                    <p:animScale>
+                                      <p:cBhvr>
+                                        <p:cTn id="13" dur="26">
+                                          <p:stCondLst>
+                                            <p:cond delay="650"/>
+                                          </p:stCondLst>
+                                        </p:cTn>
+                                        <p:tgtEl>
+                                          <p:spTgt spid="3"/>
+                                        </p:tgtEl>
+                                      </p:cBhvr>
+                                      <p:to x="100000" y="60000"/>
+                                    </p:animScale>
+                                    <p:animScale>
+                                      <p:cBhvr>
+                                        <p:cTn id="14" dur="166" decel="50000">
+                                          <p:stCondLst>
+                                            <p:cond delay="676"/>
+                                          </p:stCondLst>
+                                        </p:cTn>
+                                        <p:tgtEl>
+                                          <p:spTgt spid="3"/>
+                                        </p:tgtEl>
+                                      </p:cBhvr>
+                                      <p:to x="100000" y="100000"/>
+                                    </p:animScale>
+                                    <p:animScale>
+                                      <p:cBhvr>
+                                        <p:cTn id="15" dur="26">
+                                          <p:stCondLst>
+                                            <p:cond delay="1312"/>
+                                          </p:stCondLst>
+                                        </p:cTn>
+                                        <p:tgtEl>
+                                          <p:spTgt spid="3"/>
+                                        </p:tgtEl>
+                                      </p:cBhvr>
+                                      <p:to x="100000" y="80000"/>
+                                    </p:animScale>
+                                    <p:animScale>
+                                      <p:cBhvr>
+                                        <p:cTn id="16" dur="166" decel="50000">
+                                          <p:stCondLst>
+                                            <p:cond delay="1338"/>
+                                          </p:stCondLst>
+                                        </p:cTn>
+                                        <p:tgtEl>
+                                          <p:spTgt spid="3"/>
+                                        </p:tgtEl>
+                                      </p:cBhvr>
+                                      <p:to x="100000" y="100000"/>
+                                    </p:animScale>
+                                    <p:animScale>
+                                      <p:cBhvr>
+                                        <p:cTn id="17" dur="26">
+                                          <p:stCondLst>
+                                            <p:cond delay="1642"/>
+                                          </p:stCondLst>
+                                        </p:cTn>
+                                        <p:tgtEl>
+                                          <p:spTgt spid="3"/>
+                                        </p:tgtEl>
+                                      </p:cBhvr>
+                                      <p:to x="100000" y="90000"/>
+                                    </p:animScale>
+                                    <p:animScale>
+                                      <p:cBhvr>
+                                        <p:cTn id="18" dur="166" decel="50000">
+                                          <p:stCondLst>
+                                            <p:cond delay="1668"/>
+                                          </p:stCondLst>
+                                        </p:cTn>
+                                        <p:tgtEl>
+                                          <p:spTgt spid="3"/>
+                                        </p:tgtEl>
+                                      </p:cBhvr>
+                                      <p:to x="100000" y="100000"/>
+                                    </p:animScale>
+                                    <p:animScale>
+                                      <p:cBhvr>
+                                        <p:cTn id="19" dur="26">
+                                          <p:stCondLst>
+                                            <p:cond delay="1808"/>
+                                          </p:stCondLst>
+                                        </p:cTn>
+                                        <p:tgtEl>
+                                          <p:spTgt spid="3"/>
+                                        </p:tgtEl>
+                                      </p:cBhvr>
+                                      <p:to x="100000" y="95000"/>
+                                    </p:animScale>
+                                    <p:animScale>
+                                      <p:cBhvr>
+                                        <p:cTn id="20" dur="166" decel="50000">
+                                          <p:stCondLst>
+                                            <p:cond delay="1834"/>
+                                          </p:stCondLst>
+                                        </p:cTn>
+                                        <p:tgtEl>
+                                          <p:spTgt spid="3"/>
+                                        </p:tgtEl>
+                                      </p:cBhvr>
+                                      <p:to x="100000" y="100000"/>
+                                    </p:animScale>
+                                  </p:childTnLst>
+                                </p:cTn>
+                              </p:par>
+                              <p:par>
+                                <p:cTn id="21" presetID="26" presetClass="entr" presetSubtype="0" fill="hold" grpId="0" nodeType="withEffect">
+                                  <p:stCondLst>
+                                    <p:cond delay="0"/>
+                                  </p:stCondLst>
+                                  <p:childTnLst>
+                                    <p:set>
+                                      <p:cBhvr>
+                                        <p:cTn id="22" dur="1" fill="hold">
+                                          <p:stCondLst>
+                                            <p:cond delay="0"/>
+                                          </p:stCondLst>
+                                        </p:cTn>
+                                        <p:tgtEl>
+                                          <p:spTgt spid="4"/>
+                                        </p:tgtEl>
+                                        <p:attrNameLst>
+                                          <p:attrName>style.visibility</p:attrName>
+                                        </p:attrNameLst>
+                                      </p:cBhvr>
+                                      <p:to>
+                                        <p:strVal val="visible"/>
+                                      </p:to>
+                                    </p:set>
+                                    <p:animEffect transition="in" filter="wipe(down)">
+                                      <p:cBhvr>
+                                        <p:cTn id="23" dur="580">
+                                          <p:stCondLst>
+                                            <p:cond delay="0"/>
+                                          </p:stCondLst>
+                                        </p:cTn>
+                                        <p:tgtEl>
+                                          <p:spTgt spid="4"/>
+                                        </p:tgtEl>
+                                      </p:cBhvr>
+                                    </p:animEffect>
+                                    <p:anim calcmode="lin" valueType="num">
+                                      <p:cBhvr>
+                                        <p:cTn id="24" dur="1822" tmFilter="0,0; 0.14,0.36; 0.43,0.73; 0.71,0.91; 1.0,1.0">
+                                          <p:stCondLst>
+                                            <p:cond delay="0"/>
+                                          </p:stCondLst>
+                                        </p:cTn>
+                                        <p:tgtEl>
+                                          <p:spTgt spid="4"/>
+                                        </p:tgtEl>
+                                        <p:attrNameLst>
+                                          <p:attrName>ppt_x</p:attrName>
+                                        </p:attrNameLst>
+                                      </p:cBhvr>
+                                      <p:tavLst>
+                                        <p:tav tm="0">
+                                          <p:val>
+                                            <p:strVal val="#ppt_x-0.25"/>
+                                          </p:val>
+                                        </p:tav>
+                                        <p:tav tm="100000">
+                                          <p:val>
+                                            <p:strVal val="#ppt_x"/>
+                                          </p:val>
+                                        </p:tav>
+                                      </p:tavLst>
+                                    </p:anim>
+                                    <p:anim calcmode="lin" valueType="num">
+                                      <p:cBhvr>
+                                        <p:cTn id="25" dur="664" tmFilter="0.0,0.0; 0.25,0.07; 0.50,0.2; 0.75,0.467; 1.0,1.0">
+                                          <p:stCondLst>
+                                            <p:cond delay="0"/>
+                                          </p:stCondLst>
+                                        </p:cTn>
+                                        <p:tgtEl>
+                                          <p:spTgt spid="4"/>
+                                        </p:tgtEl>
+                                        <p:attrNameLst>
+                                          <p:attrName>ppt_y</p:attrName>
+                                        </p:attrNameLst>
+                                      </p:cBhvr>
+                                      <p:tavLst>
+                                        <p:tav tm="0" fmla="#ppt_y-sin(pi*$)/3">
+                                          <p:val>
+                                            <p:fltVal val="0.5"/>
+                                          </p:val>
+                                        </p:tav>
+                                        <p:tav tm="100000">
+                                          <p:val>
+                                            <p:fltVal val="1"/>
+                                          </p:val>
+                                        </p:tav>
+                                      </p:tavLst>
+                                    </p:anim>
+                                    <p:anim calcmode="lin" valueType="num">
+                                      <p:cBhvr>
+                                        <p:cTn id="26" dur="664" tmFilter="0, 0; 0.125,0.2665; 0.25,0.4; 0.375,0.465; 0.5,0.5;  0.625,0.535; 0.75,0.6; 0.875,0.7335; 1,1">
+                                          <p:stCondLst>
+                                            <p:cond delay="664"/>
+                                          </p:stCondLst>
+                                        </p:cTn>
+                                        <p:tgtEl>
+                                          <p:spTgt spid="4"/>
+                                        </p:tgtEl>
+                                        <p:attrNameLst>
+                                          <p:attrName>ppt_y</p:attrName>
+                                        </p:attrNameLst>
+                                      </p:cBhvr>
+                                      <p:tavLst>
+                                        <p:tav tm="0" fmla="#ppt_y-sin(pi*$)/9">
+                                          <p:val>
+                                            <p:fltVal val="0"/>
+                                          </p:val>
+                                        </p:tav>
+                                        <p:tav tm="100000">
+                                          <p:val>
+                                            <p:fltVal val="1"/>
+                                          </p:val>
+                                        </p:tav>
+                                      </p:tavLst>
+                                    </p:anim>
+                                    <p:anim calcmode="lin" valueType="num">
+                                      <p:cBhvr>
+                                        <p:cTn id="27" dur="332" tmFilter="0, 0; 0.125,0.2665; 0.25,0.4; 0.375,0.465; 0.5,0.5;  0.625,0.535; 0.75,0.6; 0.875,0.7335; 1,1">
+                                          <p:stCondLst>
+                                            <p:cond delay="1324"/>
+                                          </p:stCondLst>
+                                        </p:cTn>
+                                        <p:tgtEl>
+                                          <p:spTgt spid="4"/>
+                                        </p:tgtEl>
+                                        <p:attrNameLst>
+                                          <p:attrName>ppt_y</p:attrName>
+                                        </p:attrNameLst>
+                                      </p:cBhvr>
+                                      <p:tavLst>
+                                        <p:tav tm="0" fmla="#ppt_y-sin(pi*$)/27">
+                                          <p:val>
+                                            <p:fltVal val="0"/>
+                                          </p:val>
+                                        </p:tav>
+                                        <p:tav tm="100000">
+                                          <p:val>
+                                            <p:fltVal val="1"/>
+                                          </p:val>
+                                        </p:tav>
+                                      </p:tavLst>
+                                    </p:anim>
+                                    <p:anim calcmode="lin" valueType="num">
+                                      <p:cBhvr>
+                                        <p:cTn id="28" dur="164" tmFilter="0, 0; 0.125,0.2665; 0.25,0.4; 0.375,0.465; 0.5,0.5;  0.625,0.535; 0.75,0.6; 0.875,0.7335; 1,1">
+                                          <p:stCondLst>
+                                            <p:cond delay="1656"/>
+                                          </p:stCondLst>
+                                        </p:cTn>
+                                        <p:tgtEl>
+                                          <p:spTgt spid="4"/>
+                                        </p:tgtEl>
+                                        <p:attrNameLst>
+                                          <p:attrName>ppt_y</p:attrName>
+                                        </p:attrNameLst>
+                                      </p:cBhvr>
+                                      <p:tavLst>
+                                        <p:tav tm="0" fmla="#ppt_y-sin(pi*$)/81">
+                                          <p:val>
+                                            <p:fltVal val="0"/>
+                                          </p:val>
+                                        </p:tav>
+                                        <p:tav tm="100000">
+                                          <p:val>
+                                            <p:fltVal val="1"/>
+                                          </p:val>
+                                        </p:tav>
+                                      </p:tavLst>
+                                    </p:anim>
+                                    <p:animScale>
+                                      <p:cBhvr>
+                                        <p:cTn id="29" dur="26">
+                                          <p:stCondLst>
+                                            <p:cond delay="650"/>
+                                          </p:stCondLst>
+                                        </p:cTn>
+                                        <p:tgtEl>
+                                          <p:spTgt spid="4"/>
+                                        </p:tgtEl>
+                                      </p:cBhvr>
+                                      <p:to x="100000" y="60000"/>
+                                    </p:animScale>
+                                    <p:animScale>
+                                      <p:cBhvr>
+                                        <p:cTn id="30" dur="166" decel="50000">
+                                          <p:stCondLst>
+                                            <p:cond delay="676"/>
+                                          </p:stCondLst>
+                                        </p:cTn>
+                                        <p:tgtEl>
+                                          <p:spTgt spid="4"/>
+                                        </p:tgtEl>
+                                      </p:cBhvr>
+                                      <p:to x="100000" y="100000"/>
+                                    </p:animScale>
+                                    <p:animScale>
+                                      <p:cBhvr>
+                                        <p:cTn id="31" dur="26">
+                                          <p:stCondLst>
+                                            <p:cond delay="1312"/>
+                                          </p:stCondLst>
+                                        </p:cTn>
+                                        <p:tgtEl>
+                                          <p:spTgt spid="4"/>
+                                        </p:tgtEl>
+                                      </p:cBhvr>
+                                      <p:to x="100000" y="80000"/>
+                                    </p:animScale>
+                                    <p:animScale>
+                                      <p:cBhvr>
+                                        <p:cTn id="32" dur="166" decel="50000">
+                                          <p:stCondLst>
+                                            <p:cond delay="1338"/>
+                                          </p:stCondLst>
+                                        </p:cTn>
+                                        <p:tgtEl>
+                                          <p:spTgt spid="4"/>
+                                        </p:tgtEl>
+                                      </p:cBhvr>
+                                      <p:to x="100000" y="100000"/>
+                                    </p:animScale>
+                                    <p:animScale>
+                                      <p:cBhvr>
+                                        <p:cTn id="33" dur="26">
+                                          <p:stCondLst>
+                                            <p:cond delay="1642"/>
+                                          </p:stCondLst>
+                                        </p:cTn>
+                                        <p:tgtEl>
+                                          <p:spTgt spid="4"/>
+                                        </p:tgtEl>
+                                      </p:cBhvr>
+                                      <p:to x="100000" y="90000"/>
+                                    </p:animScale>
+                                    <p:animScale>
+                                      <p:cBhvr>
+                                        <p:cTn id="34" dur="166" decel="50000">
+                                          <p:stCondLst>
+                                            <p:cond delay="1668"/>
+                                          </p:stCondLst>
+                                        </p:cTn>
+                                        <p:tgtEl>
+                                          <p:spTgt spid="4"/>
+                                        </p:tgtEl>
+                                      </p:cBhvr>
+                                      <p:to x="100000" y="100000"/>
+                                    </p:animScale>
+                                    <p:animScale>
+                                      <p:cBhvr>
+                                        <p:cTn id="35" dur="26">
+                                          <p:stCondLst>
+                                            <p:cond delay="1808"/>
+                                          </p:stCondLst>
+                                        </p:cTn>
+                                        <p:tgtEl>
+                                          <p:spTgt spid="4"/>
+                                        </p:tgtEl>
+                                      </p:cBhvr>
+                                      <p:to x="100000" y="95000"/>
+                                    </p:animScale>
+                                    <p:animScale>
+                                      <p:cBhvr>
+                                        <p:cTn id="36" dur="166" decel="50000">
+                                          <p:stCondLst>
+                                            <p:cond delay="1834"/>
+                                          </p:stCondLst>
+                                        </p:cTn>
+                                        <p:tgtEl>
+                                          <p:spTgt spid="4"/>
+                                        </p:tgtEl>
+                                      </p:cBhvr>
+                                      <p:to x="100000" y="100000"/>
+                                    </p:animScale>
+                                  </p:childTnLst>
+                                </p:cTn>
+                              </p:par>
+                            </p:childTnLst>
+                          </p:cTn>
+                        </p:par>
+                      </p:childTnLst>
+                    </p:cTn>
+                  </p:par>
+                  <p:par>
+                    <p:cTn id="37" fill="hold">
+                      <p:stCondLst>
+                        <p:cond delay="indefinite"/>
+                      </p:stCondLst>
+                      <p:childTnLst>
+                        <p:par>
+                          <p:cTn id="38" fill="hold">
+                            <p:stCondLst>
+                              <p:cond delay="0"/>
+                            </p:stCondLst>
+                            <p:childTnLst>
+                              <p:par>
+                                <p:cTn id="39" presetID="2" presetClass="entr" presetSubtype="4" fill="hold" grpId="0" nodeType="clickEffect">
+                                  <p:stCondLst>
+                                    <p:cond delay="0"/>
+                                  </p:stCondLst>
+                                  <p:childTnLst>
+                                    <p:set>
+                                      <p:cBhvr>
+                                        <p:cTn id="40" dur="1" fill="hold">
+                                          <p:stCondLst>
+                                            <p:cond delay="0"/>
+                                          </p:stCondLst>
+                                        </p:cTn>
+                                        <p:tgtEl>
+                                          <p:spTgt spid="6"/>
+                                        </p:tgtEl>
+                                        <p:attrNameLst>
+                                          <p:attrName>style.visibility</p:attrName>
+                                        </p:attrNameLst>
+                                      </p:cBhvr>
+                                      <p:to>
+                                        <p:strVal val="visible"/>
+                                      </p:to>
+                                    </p:set>
+                                    <p:anim calcmode="lin" valueType="num">
+                                      <p:cBhvr additive="base">
+                                        <p:cTn id="41" dur="500" fill="hold"/>
+                                        <p:tgtEl>
+                                          <p:spTgt spid="6"/>
+                                        </p:tgtEl>
+                                        <p:attrNameLst>
+                                          <p:attrName>ppt_x</p:attrName>
+                                        </p:attrNameLst>
+                                      </p:cBhvr>
+                                      <p:tavLst>
+                                        <p:tav tm="0">
+                                          <p:val>
+                                            <p:strVal val="#ppt_x"/>
+                                          </p:val>
+                                        </p:tav>
+                                        <p:tav tm="100000">
+                                          <p:val>
+                                            <p:strVal val="#ppt_x"/>
+                                          </p:val>
+                                        </p:tav>
+                                      </p:tavLst>
+                                    </p:anim>
+                                    <p:anim calcmode="lin" valueType="num">
+                                      <p:cBhvr additive="base">
+                                        <p:cTn id="42" dur="500" fill="hold"/>
+                                        <p:tgtEl>
+                                          <p:spTgt spid="6"/>
+                                        </p:tgtEl>
+                                        <p:attrNameLst>
+                                          <p:attrName>ppt_y</p:attrName>
+                                        </p:attrNameLst>
+                                      </p:cBhvr>
+                                      <p:tavLst>
+                                        <p:tav tm="0">
+                                          <p:val>
+                                            <p:strVal val="1+#ppt_h/2"/>
+                                          </p:val>
+                                        </p:tav>
+                                        <p:tav tm="100000">
+                                          <p:val>
+                                            <p:strVal val="#ppt_y"/>
+                                          </p:val>
+                                        </p:tav>
+                                      </p:tavLst>
+                                    </p:anim>
+                                  </p:childTnLst>
+                                </p:cTn>
+                              </p:par>
+                              <p:par>
+                                <p:cTn id="43" presetID="2" presetClass="entr" presetSubtype="4" fill="hold" grpId="0" nodeType="withEffect">
+                                  <p:stCondLst>
+                                    <p:cond delay="0"/>
+                                  </p:stCondLst>
+                                  <p:childTnLst>
+                                    <p:set>
+                                      <p:cBhvr>
+                                        <p:cTn id="44" dur="1" fill="hold">
+                                          <p:stCondLst>
+                                            <p:cond delay="0"/>
+                                          </p:stCondLst>
+                                        </p:cTn>
+                                        <p:tgtEl>
+                                          <p:spTgt spid="8"/>
+                                        </p:tgtEl>
+                                        <p:attrNameLst>
+                                          <p:attrName>style.visibility</p:attrName>
+                                        </p:attrNameLst>
+                                      </p:cBhvr>
+                                      <p:to>
+                                        <p:strVal val="visible"/>
+                                      </p:to>
+                                    </p:set>
+                                    <p:anim calcmode="lin" valueType="num">
+                                      <p:cBhvr additive="base">
+                                        <p:cTn id="45" dur="500" fill="hold"/>
+                                        <p:tgtEl>
+                                          <p:spTgt spid="8"/>
+                                        </p:tgtEl>
+                                        <p:attrNameLst>
+                                          <p:attrName>ppt_x</p:attrName>
+                                        </p:attrNameLst>
+                                      </p:cBhvr>
+                                      <p:tavLst>
+                                        <p:tav tm="0">
+                                          <p:val>
+                                            <p:strVal val="#ppt_x"/>
+                                          </p:val>
+                                        </p:tav>
+                                        <p:tav tm="100000">
+                                          <p:val>
+                                            <p:strVal val="#ppt_x"/>
+                                          </p:val>
+                                        </p:tav>
+                                      </p:tavLst>
+                                    </p:anim>
+                                    <p:anim calcmode="lin" valueType="num">
+                                      <p:cBhvr additive="base">
+                                        <p:cTn id="46" dur="500" fill="hold"/>
+                                        <p:tgtEl>
+                                          <p:spTgt spid="8"/>
+                                        </p:tgtEl>
+                                        <p:attrNameLst>
+                                          <p:attrName>ppt_y</p:attrName>
+                                        </p:attrNameLst>
+                                      </p:cBhvr>
+                                      <p:tavLst>
+                                        <p:tav tm="0">
+                                          <p:val>
+                                            <p:strVal val="1+#ppt_h/2"/>
+                                          </p:val>
+                                        </p:tav>
+                                        <p:tav tm="100000">
+                                          <p:val>
+                                            <p:strVal val="#ppt_y"/>
+                                          </p:val>
+                                        </p:tav>
+                                      </p:tavLst>
+                                    </p:anim>
+                                  </p:childTnLst>
+                                </p:cTn>
+                              </p:par>
+                            </p:childTnLst>
+                          </p:cTn>
+                        </p:par>
+                      </p:childTnLst>
+                    </p:cTn>
+                  </p:par>
+                </p:childTnLst>
+              </p:cTn>
+              <p:prevCondLst>
+                <p:cond evt="onPrev" delay="0">
+                  <p:tgtEl>
+                    <p:sldTgt/>
+                  </p:tgtEl>
+                </p:cond>
+              </p:prevCondLst>
+              <p:nextCondLst>
+                <p:cond evt="onNext" delay="0">
+                  <p:tgtEl>
+                    <p:sldTgt/>
+                  </p:tgtEl>
+                </p:cond>
+              </p:nextCondLst>
+            </p:seq>
+          </p:childTnLst>
+        </p:cTn>
+      </p:par>
+    </p:tnLst>
+    <p:bldLst>
+      <p:bldP spid="3" grpId="0" animBg="1"/>
+      <p:bldP spid="4" grpId="0"/>
+      <p:bldP spid="6" grpId="0" animBg="1"/>
+      <p:bldP spid="8" grpId="0"/>
+    </p:bldLst>
+  </p:timing>
 </p:sld>
 </file>
 

</xml_diff>

<commit_message>
Update slide once more
</commit_message>
<xml_diff>
--- a/Fluentd meetup 2019.pptx
+++ b/Fluentd meetup 2019.pptx
@@ -17736,8 +17736,8 @@
         </p:nvSpPr>
         <p:spPr>
           <a:xfrm>
-            <a:off x="2514601" y="1780674"/>
-            <a:ext cx="1902326" cy="315495"/>
+            <a:off x="2514601" y="1836243"/>
+            <a:ext cx="1902326" cy="223584"/>
           </a:xfrm>
           <a:prstGeom prst="ellipse">
             <a:avLst/>
@@ -17788,8 +17788,8 @@
         </p:nvSpPr>
         <p:spPr>
           <a:xfrm>
-            <a:off x="2548516" y="2868838"/>
-            <a:ext cx="2113051" cy="315495"/>
+            <a:off x="2514601" y="2921466"/>
+            <a:ext cx="2113051" cy="220850"/>
           </a:xfrm>
           <a:prstGeom prst="ellipse">
             <a:avLst/>
@@ -17840,8 +17840,8 @@
         </p:nvSpPr>
         <p:spPr>
           <a:xfrm>
-            <a:off x="2548517" y="5213659"/>
-            <a:ext cx="1919210" cy="315495"/>
+            <a:off x="2548517" y="5289958"/>
+            <a:ext cx="1919210" cy="239196"/>
           </a:xfrm>
           <a:prstGeom prst="ellipse">
             <a:avLst/>
@@ -17892,8 +17892,8 @@
         </p:nvSpPr>
         <p:spPr>
           <a:xfrm>
-            <a:off x="3360821" y="5743271"/>
-            <a:ext cx="1596190" cy="315495"/>
+            <a:off x="3360821" y="5847927"/>
+            <a:ext cx="1596190" cy="210839"/>
           </a:xfrm>
           <a:prstGeom prst="ellipse">
             <a:avLst/>
@@ -17945,7 +17945,7 @@
         <p:spPr>
           <a:xfrm>
             <a:off x="3360821" y="6410876"/>
-            <a:ext cx="1967832" cy="256948"/>
+            <a:ext cx="1967832" cy="204335"/>
           </a:xfrm>
           <a:prstGeom prst="ellipse">
             <a:avLst/>
@@ -17996,8 +17996,8 @@
         </p:nvSpPr>
         <p:spPr>
           <a:xfrm>
-            <a:off x="2548516" y="4684047"/>
-            <a:ext cx="2113052" cy="315495"/>
+            <a:off x="2514601" y="4757201"/>
+            <a:ext cx="2113052" cy="197076"/>
           </a:xfrm>
           <a:prstGeom prst="ellipse">
             <a:avLst/>
@@ -18062,7 +18062,7 @@
         </p:blipFill>
         <p:spPr>
           <a:xfrm>
-            <a:off x="2231736" y="1754564"/>
+            <a:off x="2080721" y="1712547"/>
             <a:ext cx="3655550" cy="379094"/>
           </a:xfrm>
           <a:prstGeom prst="rect">
@@ -18103,7 +18103,7 @@
         </p:blipFill>
         <p:spPr>
           <a:xfrm>
-            <a:off x="2210280" y="2863402"/>
+            <a:off x="2132371" y="2826025"/>
             <a:ext cx="3603266" cy="326580"/>
           </a:xfrm>
           <a:prstGeom prst="rect">
@@ -18144,7 +18144,7 @@
         </p:blipFill>
         <p:spPr>
           <a:xfrm>
-            <a:off x="2117749" y="4684820"/>
+            <a:off x="2117749" y="4685002"/>
             <a:ext cx="3788328" cy="266707"/>
           </a:xfrm>
           <a:prstGeom prst="rect">
@@ -18185,7 +18185,7 @@
         </p:blipFill>
         <p:spPr>
           <a:xfrm>
-            <a:off x="2117749" y="5201793"/>
+            <a:off x="2210280" y="5240855"/>
             <a:ext cx="3396432" cy="299365"/>
           </a:xfrm>
           <a:prstGeom prst="rect">
@@ -18226,7 +18226,7 @@
         </p:blipFill>
         <p:spPr>
           <a:xfrm>
-            <a:off x="2514601" y="5749153"/>
+            <a:off x="2462890" y="5781534"/>
             <a:ext cx="3908074" cy="277593"/>
           </a:xfrm>
           <a:prstGeom prst="rect">
@@ -18267,7 +18267,7 @@
         </p:blipFill>
         <p:spPr>
           <a:xfrm>
-            <a:off x="2252426" y="6415933"/>
+            <a:off x="2609980" y="6349543"/>
             <a:ext cx="4430602" cy="228606"/>
           </a:xfrm>
           <a:prstGeom prst="rect">
@@ -20655,7 +20655,7 @@
         </p:blipFill>
         <p:spPr>
           <a:xfrm>
-            <a:off x="890243" y="1871963"/>
+            <a:off x="890243" y="1801624"/>
             <a:ext cx="4758298" cy="4351338"/>
           </a:xfrm>
           <a:prstGeom prst="rect">
@@ -21233,170 +21233,6 @@
           </a:prstGeom>
         </p:spPr>
       </p:pic>
-      <p:sp>
-        <p:nvSpPr>
-          <p:cNvPr id="3" name="矢印: ストライプ 2">
-            <a:extLst>
-              <a:ext uri="{FF2B5EF4-FFF2-40B4-BE49-F238E27FC236}">
-                <a16:creationId xmlns:a16="http://schemas.microsoft.com/office/drawing/2014/main" id="{C7CFE177-048F-4CD9-8C48-E49C572DF77C}"/>
-              </a:ext>
-            </a:extLst>
-          </p:cNvPr>
-          <p:cNvSpPr/>
-          <p:nvPr/>
-        </p:nvSpPr>
-        <p:spPr>
-          <a:xfrm rot="5400000">
-            <a:off x="4248545" y="3416214"/>
-            <a:ext cx="1174446" cy="222737"/>
-          </a:xfrm>
-          <a:prstGeom prst="stripedRightArrow">
-            <a:avLst/>
-          </a:prstGeom>
-        </p:spPr>
-        <p:style>
-          <a:lnRef idx="2">
-            <a:schemeClr val="accent1">
-              <a:shade val="50000"/>
-            </a:schemeClr>
-          </a:lnRef>
-          <a:fillRef idx="1">
-            <a:schemeClr val="accent1"/>
-          </a:fillRef>
-          <a:effectRef idx="0">
-            <a:schemeClr val="accent1"/>
-          </a:effectRef>
-          <a:fontRef idx="minor">
-            <a:schemeClr val="lt1"/>
-          </a:fontRef>
-        </p:style>
-        <p:txBody>
-          <a:bodyPr rtlCol="0" anchor="ctr"/>
-          <a:lstStyle/>
-          <a:p>
-            <a:pPr algn="ctr"/>
-            <a:endParaRPr kumimoji="1" lang="ja-JP" altLang="en-US"/>
-          </a:p>
-        </p:txBody>
-      </p:sp>
-      <p:sp>
-        <p:nvSpPr>
-          <p:cNvPr id="4" name="テキスト ボックス 3">
-            <a:extLst>
-              <a:ext uri="{FF2B5EF4-FFF2-40B4-BE49-F238E27FC236}">
-                <a16:creationId xmlns:a16="http://schemas.microsoft.com/office/drawing/2014/main" id="{70B97599-42F0-47A7-8911-B6DB04DF3ED3}"/>
-              </a:ext>
-            </a:extLst>
-          </p:cNvPr>
-          <p:cNvSpPr txBox="1"/>
-          <p:nvPr/>
-        </p:nvSpPr>
-        <p:spPr>
-          <a:xfrm>
-            <a:off x="4947137" y="3342916"/>
-            <a:ext cx="750277" cy="369332"/>
-          </a:xfrm>
-          <a:prstGeom prst="rect">
-            <a:avLst/>
-          </a:prstGeom>
-          <a:noFill/>
-        </p:spPr>
-        <p:txBody>
-          <a:bodyPr wrap="square" rtlCol="0">
-            <a:spAutoFit/>
-          </a:bodyPr>
-          <a:lstStyle/>
-          <a:p>
-            <a:r>
-              <a:rPr kumimoji="1" lang="en-US" altLang="ja-JP" dirty="0"/>
-              <a:t>Down</a:t>
-            </a:r>
-            <a:endParaRPr kumimoji="1" lang="ja-JP" altLang="en-US" dirty="0"/>
-          </a:p>
-        </p:txBody>
-      </p:sp>
-      <p:sp>
-        <p:nvSpPr>
-          <p:cNvPr id="6" name="矢印: 上 5">
-            <a:extLst>
-              <a:ext uri="{FF2B5EF4-FFF2-40B4-BE49-F238E27FC236}">
-                <a16:creationId xmlns:a16="http://schemas.microsoft.com/office/drawing/2014/main" id="{C7B2B59F-C534-44A0-BA41-E068805984BE}"/>
-              </a:ext>
-            </a:extLst>
-          </p:cNvPr>
-          <p:cNvSpPr/>
-          <p:nvPr/>
-        </p:nvSpPr>
-        <p:spPr>
-          <a:xfrm>
-            <a:off x="4640344" y="5074603"/>
-            <a:ext cx="390847" cy="181707"/>
-          </a:xfrm>
-          <a:prstGeom prst="upArrow">
-            <a:avLst/>
-          </a:prstGeom>
-        </p:spPr>
-        <p:style>
-          <a:lnRef idx="2">
-            <a:schemeClr val="accent1">
-              <a:shade val="50000"/>
-            </a:schemeClr>
-          </a:lnRef>
-          <a:fillRef idx="1">
-            <a:schemeClr val="accent1"/>
-          </a:fillRef>
-          <a:effectRef idx="0">
-            <a:schemeClr val="accent1"/>
-          </a:effectRef>
-          <a:fontRef idx="minor">
-            <a:schemeClr val="lt1"/>
-          </a:fontRef>
-        </p:style>
-        <p:txBody>
-          <a:bodyPr rtlCol="0" anchor="ctr"/>
-          <a:lstStyle/>
-          <a:p>
-            <a:pPr algn="ctr"/>
-            <a:endParaRPr kumimoji="1" lang="ja-JP" altLang="en-US"/>
-          </a:p>
-        </p:txBody>
-      </p:sp>
-      <p:sp>
-        <p:nvSpPr>
-          <p:cNvPr id="8" name="テキスト ボックス 7">
-            <a:extLst>
-              <a:ext uri="{FF2B5EF4-FFF2-40B4-BE49-F238E27FC236}">
-                <a16:creationId xmlns:a16="http://schemas.microsoft.com/office/drawing/2014/main" id="{05549C98-1F23-42CA-8ACA-A077C9E81749}"/>
-              </a:ext>
-            </a:extLst>
-          </p:cNvPr>
-          <p:cNvSpPr txBox="1"/>
-          <p:nvPr/>
-        </p:nvSpPr>
-        <p:spPr>
-          <a:xfrm>
-            <a:off x="5031191" y="4941277"/>
-            <a:ext cx="1187901" cy="369332"/>
-          </a:xfrm>
-          <a:prstGeom prst="rect">
-            <a:avLst/>
-          </a:prstGeom>
-          <a:noFill/>
-        </p:spPr>
-        <p:txBody>
-          <a:bodyPr wrap="square" rtlCol="0">
-            <a:spAutoFit/>
-          </a:bodyPr>
-          <a:lstStyle/>
-          <a:p>
-            <a:r>
-              <a:rPr kumimoji="1" lang="en-US" altLang="ja-JP" dirty="0"/>
-              <a:t>Slightly Up</a:t>
-            </a:r>
-            <a:endParaRPr kumimoji="1" lang="ja-JP" altLang="en-US" dirty="0"/>
-          </a:p>
-        </p:txBody>
-      </p:sp>
     </p:spTree>
     <p:extLst>
       <p:ext uri="{BB962C8B-B14F-4D97-AF65-F5344CB8AC3E}">
@@ -21407,780 +21243,6 @@
   <p:clrMapOvr>
     <a:masterClrMapping/>
   </p:clrMapOvr>
-  <p:timing>
-    <p:tnLst>
-      <p:par>
-        <p:cTn id="1" dur="indefinite" restart="never" nodeType="tmRoot">
-          <p:childTnLst>
-            <p:seq concurrent="1" nextAc="seek">
-              <p:cTn id="2" dur="indefinite" nodeType="mainSeq">
-                <p:childTnLst>
-                  <p:par>
-                    <p:cTn id="3" fill="hold">
-                      <p:stCondLst>
-                        <p:cond delay="indefinite"/>
-                      </p:stCondLst>
-                      <p:childTnLst>
-                        <p:par>
-                          <p:cTn id="4" fill="hold">
-                            <p:stCondLst>
-                              <p:cond delay="0"/>
-                            </p:stCondLst>
-                            <p:childTnLst>
-                              <p:par>
-                                <p:cTn id="5" presetID="26" presetClass="entr" presetSubtype="0" fill="hold" grpId="0" nodeType="clickEffect">
-                                  <p:stCondLst>
-                                    <p:cond delay="0"/>
-                                  </p:stCondLst>
-                                  <p:childTnLst>
-                                    <p:set>
-                                      <p:cBhvr>
-                                        <p:cTn id="6" dur="1" fill="hold">
-                                          <p:stCondLst>
-                                            <p:cond delay="0"/>
-                                          </p:stCondLst>
-                                        </p:cTn>
-                                        <p:tgtEl>
-                                          <p:spTgt spid="3"/>
-                                        </p:tgtEl>
-                                        <p:attrNameLst>
-                                          <p:attrName>style.visibility</p:attrName>
-                                        </p:attrNameLst>
-                                      </p:cBhvr>
-                                      <p:to>
-                                        <p:strVal val="visible"/>
-                                      </p:to>
-                                    </p:set>
-                                    <p:animEffect transition="in" filter="wipe(down)">
-                                      <p:cBhvr>
-                                        <p:cTn id="7" dur="580">
-                                          <p:stCondLst>
-                                            <p:cond delay="0"/>
-                                          </p:stCondLst>
-                                        </p:cTn>
-                                        <p:tgtEl>
-                                          <p:spTgt spid="3"/>
-                                        </p:tgtEl>
-                                      </p:cBhvr>
-                                    </p:animEffect>
-                                    <p:anim calcmode="lin" valueType="num">
-                                      <p:cBhvr>
-                                        <p:cTn id="8" dur="1822" tmFilter="0,0; 0.14,0.36; 0.43,0.73; 0.71,0.91; 1.0,1.0">
-                                          <p:stCondLst>
-                                            <p:cond delay="0"/>
-                                          </p:stCondLst>
-                                        </p:cTn>
-                                        <p:tgtEl>
-                                          <p:spTgt spid="3"/>
-                                        </p:tgtEl>
-                                        <p:attrNameLst>
-                                          <p:attrName>ppt_x</p:attrName>
-                                        </p:attrNameLst>
-                                      </p:cBhvr>
-                                      <p:tavLst>
-                                        <p:tav tm="0">
-                                          <p:val>
-                                            <p:strVal val="#ppt_x-0.25"/>
-                                          </p:val>
-                                        </p:tav>
-                                        <p:tav tm="100000">
-                                          <p:val>
-                                            <p:strVal val="#ppt_x"/>
-                                          </p:val>
-                                        </p:tav>
-                                      </p:tavLst>
-                                    </p:anim>
-                                    <p:anim calcmode="lin" valueType="num">
-                                      <p:cBhvr>
-                                        <p:cTn id="9" dur="664" tmFilter="0.0,0.0; 0.25,0.07; 0.50,0.2; 0.75,0.467; 1.0,1.0">
-                                          <p:stCondLst>
-                                            <p:cond delay="0"/>
-                                          </p:stCondLst>
-                                        </p:cTn>
-                                        <p:tgtEl>
-                                          <p:spTgt spid="3"/>
-                                        </p:tgtEl>
-                                        <p:attrNameLst>
-                                          <p:attrName>ppt_y</p:attrName>
-                                        </p:attrNameLst>
-                                      </p:cBhvr>
-                                      <p:tavLst>
-                                        <p:tav tm="0" fmla="#ppt_y-sin(pi*$)/3">
-                                          <p:val>
-                                            <p:fltVal val="0.5"/>
-                                          </p:val>
-                                        </p:tav>
-                                        <p:tav tm="100000">
-                                          <p:val>
-                                            <p:fltVal val="1"/>
-                                          </p:val>
-                                        </p:tav>
-                                      </p:tavLst>
-                                    </p:anim>
-                                    <p:anim calcmode="lin" valueType="num">
-                                      <p:cBhvr>
-                                        <p:cTn id="10" dur="664" tmFilter="0, 0; 0.125,0.2665; 0.25,0.4; 0.375,0.465; 0.5,0.5;  0.625,0.535; 0.75,0.6; 0.875,0.7335; 1,1">
-                                          <p:stCondLst>
-                                            <p:cond delay="664"/>
-                                          </p:stCondLst>
-                                        </p:cTn>
-                                        <p:tgtEl>
-                                          <p:spTgt spid="3"/>
-                                        </p:tgtEl>
-                                        <p:attrNameLst>
-                                          <p:attrName>ppt_y</p:attrName>
-                                        </p:attrNameLst>
-                                      </p:cBhvr>
-                                      <p:tavLst>
-                                        <p:tav tm="0" fmla="#ppt_y-sin(pi*$)/9">
-                                          <p:val>
-                                            <p:fltVal val="0"/>
-                                          </p:val>
-                                        </p:tav>
-                                        <p:tav tm="100000">
-                                          <p:val>
-                                            <p:fltVal val="1"/>
-                                          </p:val>
-                                        </p:tav>
-                                      </p:tavLst>
-                                    </p:anim>
-                                    <p:anim calcmode="lin" valueType="num">
-                                      <p:cBhvr>
-                                        <p:cTn id="11" dur="332" tmFilter="0, 0; 0.125,0.2665; 0.25,0.4; 0.375,0.465; 0.5,0.5;  0.625,0.535; 0.75,0.6; 0.875,0.7335; 1,1">
-                                          <p:stCondLst>
-                                            <p:cond delay="1324"/>
-                                          </p:stCondLst>
-                                        </p:cTn>
-                                        <p:tgtEl>
-                                          <p:spTgt spid="3"/>
-                                        </p:tgtEl>
-                                        <p:attrNameLst>
-                                          <p:attrName>ppt_y</p:attrName>
-                                        </p:attrNameLst>
-                                      </p:cBhvr>
-                                      <p:tavLst>
-                                        <p:tav tm="0" fmla="#ppt_y-sin(pi*$)/27">
-                                          <p:val>
-                                            <p:fltVal val="0"/>
-                                          </p:val>
-                                        </p:tav>
-                                        <p:tav tm="100000">
-                                          <p:val>
-                                            <p:fltVal val="1"/>
-                                          </p:val>
-                                        </p:tav>
-                                      </p:tavLst>
-                                    </p:anim>
-                                    <p:anim calcmode="lin" valueType="num">
-                                      <p:cBhvr>
-                                        <p:cTn id="12" dur="164" tmFilter="0, 0; 0.125,0.2665; 0.25,0.4; 0.375,0.465; 0.5,0.5;  0.625,0.535; 0.75,0.6; 0.875,0.7335; 1,1">
-                                          <p:stCondLst>
-                                            <p:cond delay="1656"/>
-                                          </p:stCondLst>
-                                        </p:cTn>
-                                        <p:tgtEl>
-                                          <p:spTgt spid="3"/>
-                                        </p:tgtEl>
-                                        <p:attrNameLst>
-                                          <p:attrName>ppt_y</p:attrName>
-                                        </p:attrNameLst>
-                                      </p:cBhvr>
-                                      <p:tavLst>
-                                        <p:tav tm="0" fmla="#ppt_y-sin(pi*$)/81">
-                                          <p:val>
-                                            <p:fltVal val="0"/>
-                                          </p:val>
-                                        </p:tav>
-                                        <p:tav tm="100000">
-                                          <p:val>
-                                            <p:fltVal val="1"/>
-                                          </p:val>
-                                        </p:tav>
-                                      </p:tavLst>
-                                    </p:anim>
-                                    <p:animScale>
-                                      <p:cBhvr>
-                                        <p:cTn id="13" dur="26">
-                                          <p:stCondLst>
-                                            <p:cond delay="650"/>
-                                          </p:stCondLst>
-                                        </p:cTn>
-                                        <p:tgtEl>
-                                          <p:spTgt spid="3"/>
-                                        </p:tgtEl>
-                                      </p:cBhvr>
-                                      <p:to x="100000" y="60000"/>
-                                    </p:animScale>
-                                    <p:animScale>
-                                      <p:cBhvr>
-                                        <p:cTn id="14" dur="166" decel="50000">
-                                          <p:stCondLst>
-                                            <p:cond delay="676"/>
-                                          </p:stCondLst>
-                                        </p:cTn>
-                                        <p:tgtEl>
-                                          <p:spTgt spid="3"/>
-                                        </p:tgtEl>
-                                      </p:cBhvr>
-                                      <p:to x="100000" y="100000"/>
-                                    </p:animScale>
-                                    <p:animScale>
-                                      <p:cBhvr>
-                                        <p:cTn id="15" dur="26">
-                                          <p:stCondLst>
-                                            <p:cond delay="1312"/>
-                                          </p:stCondLst>
-                                        </p:cTn>
-                                        <p:tgtEl>
-                                          <p:spTgt spid="3"/>
-                                        </p:tgtEl>
-                                      </p:cBhvr>
-                                      <p:to x="100000" y="80000"/>
-                                    </p:animScale>
-                                    <p:animScale>
-                                      <p:cBhvr>
-                                        <p:cTn id="16" dur="166" decel="50000">
-                                          <p:stCondLst>
-                                            <p:cond delay="1338"/>
-                                          </p:stCondLst>
-                                        </p:cTn>
-                                        <p:tgtEl>
-                                          <p:spTgt spid="3"/>
-                                        </p:tgtEl>
-                                      </p:cBhvr>
-                                      <p:to x="100000" y="100000"/>
-                                    </p:animScale>
-                                    <p:animScale>
-                                      <p:cBhvr>
-                                        <p:cTn id="17" dur="26">
-                                          <p:stCondLst>
-                                            <p:cond delay="1642"/>
-                                          </p:stCondLst>
-                                        </p:cTn>
-                                        <p:tgtEl>
-                                          <p:spTgt spid="3"/>
-                                        </p:tgtEl>
-                                      </p:cBhvr>
-                                      <p:to x="100000" y="90000"/>
-                                    </p:animScale>
-                                    <p:animScale>
-                                      <p:cBhvr>
-                                        <p:cTn id="18" dur="166" decel="50000">
-                                          <p:stCondLst>
-                                            <p:cond delay="1668"/>
-                                          </p:stCondLst>
-                                        </p:cTn>
-                                        <p:tgtEl>
-                                          <p:spTgt spid="3"/>
-                                        </p:tgtEl>
-                                      </p:cBhvr>
-                                      <p:to x="100000" y="100000"/>
-                                    </p:animScale>
-                                    <p:animScale>
-                                      <p:cBhvr>
-                                        <p:cTn id="19" dur="26">
-                                          <p:stCondLst>
-                                            <p:cond delay="1808"/>
-                                          </p:stCondLst>
-                                        </p:cTn>
-                                        <p:tgtEl>
-                                          <p:spTgt spid="3"/>
-                                        </p:tgtEl>
-                                      </p:cBhvr>
-                                      <p:to x="100000" y="95000"/>
-                                    </p:animScale>
-                                    <p:animScale>
-                                      <p:cBhvr>
-                                        <p:cTn id="20" dur="166" decel="50000">
-                                          <p:stCondLst>
-                                            <p:cond delay="1834"/>
-                                          </p:stCondLst>
-                                        </p:cTn>
-                                        <p:tgtEl>
-                                          <p:spTgt spid="3"/>
-                                        </p:tgtEl>
-                                      </p:cBhvr>
-                                      <p:to x="100000" y="100000"/>
-                                    </p:animScale>
-                                  </p:childTnLst>
-                                </p:cTn>
-                              </p:par>
-                              <p:par>
-                                <p:cTn id="21" presetID="26" presetClass="entr" presetSubtype="0" fill="hold" grpId="0" nodeType="withEffect">
-                                  <p:stCondLst>
-                                    <p:cond delay="0"/>
-                                  </p:stCondLst>
-                                  <p:childTnLst>
-                                    <p:set>
-                                      <p:cBhvr>
-                                        <p:cTn id="22" dur="1" fill="hold">
-                                          <p:stCondLst>
-                                            <p:cond delay="0"/>
-                                          </p:stCondLst>
-                                        </p:cTn>
-                                        <p:tgtEl>
-                                          <p:spTgt spid="4"/>
-                                        </p:tgtEl>
-                                        <p:attrNameLst>
-                                          <p:attrName>style.visibility</p:attrName>
-                                        </p:attrNameLst>
-                                      </p:cBhvr>
-                                      <p:to>
-                                        <p:strVal val="visible"/>
-                                      </p:to>
-                                    </p:set>
-                                    <p:animEffect transition="in" filter="wipe(down)">
-                                      <p:cBhvr>
-                                        <p:cTn id="23" dur="580">
-                                          <p:stCondLst>
-                                            <p:cond delay="0"/>
-                                          </p:stCondLst>
-                                        </p:cTn>
-                                        <p:tgtEl>
-                                          <p:spTgt spid="4"/>
-                                        </p:tgtEl>
-                                      </p:cBhvr>
-                                    </p:animEffect>
-                                    <p:anim calcmode="lin" valueType="num">
-                                      <p:cBhvr>
-                                        <p:cTn id="24" dur="1822" tmFilter="0,0; 0.14,0.36; 0.43,0.73; 0.71,0.91; 1.0,1.0">
-                                          <p:stCondLst>
-                                            <p:cond delay="0"/>
-                                          </p:stCondLst>
-                                        </p:cTn>
-                                        <p:tgtEl>
-                                          <p:spTgt spid="4"/>
-                                        </p:tgtEl>
-                                        <p:attrNameLst>
-                                          <p:attrName>ppt_x</p:attrName>
-                                        </p:attrNameLst>
-                                      </p:cBhvr>
-                                      <p:tavLst>
-                                        <p:tav tm="0">
-                                          <p:val>
-                                            <p:strVal val="#ppt_x-0.25"/>
-                                          </p:val>
-                                        </p:tav>
-                                        <p:tav tm="100000">
-                                          <p:val>
-                                            <p:strVal val="#ppt_x"/>
-                                          </p:val>
-                                        </p:tav>
-                                      </p:tavLst>
-                                    </p:anim>
-                                    <p:anim calcmode="lin" valueType="num">
-                                      <p:cBhvr>
-                                        <p:cTn id="25" dur="664" tmFilter="0.0,0.0; 0.25,0.07; 0.50,0.2; 0.75,0.467; 1.0,1.0">
-                                          <p:stCondLst>
-                                            <p:cond delay="0"/>
-                                          </p:stCondLst>
-                                        </p:cTn>
-                                        <p:tgtEl>
-                                          <p:spTgt spid="4"/>
-                                        </p:tgtEl>
-                                        <p:attrNameLst>
-                                          <p:attrName>ppt_y</p:attrName>
-                                        </p:attrNameLst>
-                                      </p:cBhvr>
-                                      <p:tavLst>
-                                        <p:tav tm="0" fmla="#ppt_y-sin(pi*$)/3">
-                                          <p:val>
-                                            <p:fltVal val="0.5"/>
-                                          </p:val>
-                                        </p:tav>
-                                        <p:tav tm="100000">
-                                          <p:val>
-                                            <p:fltVal val="1"/>
-                                          </p:val>
-                                        </p:tav>
-                                      </p:tavLst>
-                                    </p:anim>
-                                    <p:anim calcmode="lin" valueType="num">
-                                      <p:cBhvr>
-                                        <p:cTn id="26" dur="664" tmFilter="0, 0; 0.125,0.2665; 0.25,0.4; 0.375,0.465; 0.5,0.5;  0.625,0.535; 0.75,0.6; 0.875,0.7335; 1,1">
-                                          <p:stCondLst>
-                                            <p:cond delay="664"/>
-                                          </p:stCondLst>
-                                        </p:cTn>
-                                        <p:tgtEl>
-                                          <p:spTgt spid="4"/>
-                                        </p:tgtEl>
-                                        <p:attrNameLst>
-                                          <p:attrName>ppt_y</p:attrName>
-                                        </p:attrNameLst>
-                                      </p:cBhvr>
-                                      <p:tavLst>
-                                        <p:tav tm="0" fmla="#ppt_y-sin(pi*$)/9">
-                                          <p:val>
-                                            <p:fltVal val="0"/>
-                                          </p:val>
-                                        </p:tav>
-                                        <p:tav tm="100000">
-                                          <p:val>
-                                            <p:fltVal val="1"/>
-                                          </p:val>
-                                        </p:tav>
-                                      </p:tavLst>
-                                    </p:anim>
-                                    <p:anim calcmode="lin" valueType="num">
-                                      <p:cBhvr>
-                                        <p:cTn id="27" dur="332" tmFilter="0, 0; 0.125,0.2665; 0.25,0.4; 0.375,0.465; 0.5,0.5;  0.625,0.535; 0.75,0.6; 0.875,0.7335; 1,1">
-                                          <p:stCondLst>
-                                            <p:cond delay="1324"/>
-                                          </p:stCondLst>
-                                        </p:cTn>
-                                        <p:tgtEl>
-                                          <p:spTgt spid="4"/>
-                                        </p:tgtEl>
-                                        <p:attrNameLst>
-                                          <p:attrName>ppt_y</p:attrName>
-                                        </p:attrNameLst>
-                                      </p:cBhvr>
-                                      <p:tavLst>
-                                        <p:tav tm="0" fmla="#ppt_y-sin(pi*$)/27">
-                                          <p:val>
-                                            <p:fltVal val="0"/>
-                                          </p:val>
-                                        </p:tav>
-                                        <p:tav tm="100000">
-                                          <p:val>
-                                            <p:fltVal val="1"/>
-                                          </p:val>
-                                        </p:tav>
-                                      </p:tavLst>
-                                    </p:anim>
-                                    <p:anim calcmode="lin" valueType="num">
-                                      <p:cBhvr>
-                                        <p:cTn id="28" dur="164" tmFilter="0, 0; 0.125,0.2665; 0.25,0.4; 0.375,0.465; 0.5,0.5;  0.625,0.535; 0.75,0.6; 0.875,0.7335; 1,1">
-                                          <p:stCondLst>
-                                            <p:cond delay="1656"/>
-                                          </p:stCondLst>
-                                        </p:cTn>
-                                        <p:tgtEl>
-                                          <p:spTgt spid="4"/>
-                                        </p:tgtEl>
-                                        <p:attrNameLst>
-                                          <p:attrName>ppt_y</p:attrName>
-                                        </p:attrNameLst>
-                                      </p:cBhvr>
-                                      <p:tavLst>
-                                        <p:tav tm="0" fmla="#ppt_y-sin(pi*$)/81">
-                                          <p:val>
-                                            <p:fltVal val="0"/>
-                                          </p:val>
-                                        </p:tav>
-                                        <p:tav tm="100000">
-                                          <p:val>
-                                            <p:fltVal val="1"/>
-                                          </p:val>
-                                        </p:tav>
-                                      </p:tavLst>
-                                    </p:anim>
-                                    <p:animScale>
-                                      <p:cBhvr>
-                                        <p:cTn id="29" dur="26">
-                                          <p:stCondLst>
-                                            <p:cond delay="650"/>
-                                          </p:stCondLst>
-                                        </p:cTn>
-                                        <p:tgtEl>
-                                          <p:spTgt spid="4"/>
-                                        </p:tgtEl>
-                                      </p:cBhvr>
-                                      <p:to x="100000" y="60000"/>
-                                    </p:animScale>
-                                    <p:animScale>
-                                      <p:cBhvr>
-                                        <p:cTn id="30" dur="166" decel="50000">
-                                          <p:stCondLst>
-                                            <p:cond delay="676"/>
-                                          </p:stCondLst>
-                                        </p:cTn>
-                                        <p:tgtEl>
-                                          <p:spTgt spid="4"/>
-                                        </p:tgtEl>
-                                      </p:cBhvr>
-                                      <p:to x="100000" y="100000"/>
-                                    </p:animScale>
-                                    <p:animScale>
-                                      <p:cBhvr>
-                                        <p:cTn id="31" dur="26">
-                                          <p:stCondLst>
-                                            <p:cond delay="1312"/>
-                                          </p:stCondLst>
-                                        </p:cTn>
-                                        <p:tgtEl>
-                                          <p:spTgt spid="4"/>
-                                        </p:tgtEl>
-                                      </p:cBhvr>
-                                      <p:to x="100000" y="80000"/>
-                                    </p:animScale>
-                                    <p:animScale>
-                                      <p:cBhvr>
-                                        <p:cTn id="32" dur="166" decel="50000">
-                                          <p:stCondLst>
-                                            <p:cond delay="1338"/>
-                                          </p:stCondLst>
-                                        </p:cTn>
-                                        <p:tgtEl>
-                                          <p:spTgt spid="4"/>
-                                        </p:tgtEl>
-                                      </p:cBhvr>
-                                      <p:to x="100000" y="100000"/>
-                                    </p:animScale>
-                                    <p:animScale>
-                                      <p:cBhvr>
-                                        <p:cTn id="33" dur="26">
-                                          <p:stCondLst>
-                                            <p:cond delay="1642"/>
-                                          </p:stCondLst>
-                                        </p:cTn>
-                                        <p:tgtEl>
-                                          <p:spTgt spid="4"/>
-                                        </p:tgtEl>
-                                      </p:cBhvr>
-                                      <p:to x="100000" y="90000"/>
-                                    </p:animScale>
-                                    <p:animScale>
-                                      <p:cBhvr>
-                                        <p:cTn id="34" dur="166" decel="50000">
-                                          <p:stCondLst>
-                                            <p:cond delay="1668"/>
-                                          </p:stCondLst>
-                                        </p:cTn>
-                                        <p:tgtEl>
-                                          <p:spTgt spid="4"/>
-                                        </p:tgtEl>
-                                      </p:cBhvr>
-                                      <p:to x="100000" y="100000"/>
-                                    </p:animScale>
-                                    <p:animScale>
-                                      <p:cBhvr>
-                                        <p:cTn id="35" dur="26">
-                                          <p:stCondLst>
-                                            <p:cond delay="1808"/>
-                                          </p:stCondLst>
-                                        </p:cTn>
-                                        <p:tgtEl>
-                                          <p:spTgt spid="4"/>
-                                        </p:tgtEl>
-                                      </p:cBhvr>
-                                      <p:to x="100000" y="95000"/>
-                                    </p:animScale>
-                                    <p:animScale>
-                                      <p:cBhvr>
-                                        <p:cTn id="36" dur="166" decel="50000">
-                                          <p:stCondLst>
-                                            <p:cond delay="1834"/>
-                                          </p:stCondLst>
-                                        </p:cTn>
-                                        <p:tgtEl>
-                                          <p:spTgt spid="4"/>
-                                        </p:tgtEl>
-                                      </p:cBhvr>
-                                      <p:to x="100000" y="100000"/>
-                                    </p:animScale>
-                                  </p:childTnLst>
-                                </p:cTn>
-                              </p:par>
-                            </p:childTnLst>
-                          </p:cTn>
-                        </p:par>
-                      </p:childTnLst>
-                    </p:cTn>
-                  </p:par>
-                  <p:par>
-                    <p:cTn id="37" fill="hold">
-                      <p:stCondLst>
-                        <p:cond delay="indefinite"/>
-                      </p:stCondLst>
-                      <p:childTnLst>
-                        <p:par>
-                          <p:cTn id="38" fill="hold">
-                            <p:stCondLst>
-                              <p:cond delay="0"/>
-                            </p:stCondLst>
-                            <p:childTnLst>
-                              <p:par>
-                                <p:cTn id="39" presetID="2" presetClass="entr" presetSubtype="4" fill="hold" grpId="0" nodeType="clickEffect">
-                                  <p:stCondLst>
-                                    <p:cond delay="0"/>
-                                  </p:stCondLst>
-                                  <p:childTnLst>
-                                    <p:set>
-                                      <p:cBhvr>
-                                        <p:cTn id="40" dur="1" fill="hold">
-                                          <p:stCondLst>
-                                            <p:cond delay="0"/>
-                                          </p:stCondLst>
-                                        </p:cTn>
-                                        <p:tgtEl>
-                                          <p:spTgt spid="6"/>
-                                        </p:tgtEl>
-                                        <p:attrNameLst>
-                                          <p:attrName>style.visibility</p:attrName>
-                                        </p:attrNameLst>
-                                      </p:cBhvr>
-                                      <p:to>
-                                        <p:strVal val="visible"/>
-                                      </p:to>
-                                    </p:set>
-                                    <p:anim calcmode="lin" valueType="num">
-                                      <p:cBhvr additive="base">
-                                        <p:cTn id="41" dur="500" fill="hold"/>
-                                        <p:tgtEl>
-                                          <p:spTgt spid="6"/>
-                                        </p:tgtEl>
-                                        <p:attrNameLst>
-                                          <p:attrName>ppt_x</p:attrName>
-                                        </p:attrNameLst>
-                                      </p:cBhvr>
-                                      <p:tavLst>
-                                        <p:tav tm="0">
-                                          <p:val>
-                                            <p:strVal val="#ppt_x"/>
-                                          </p:val>
-                                        </p:tav>
-                                        <p:tav tm="100000">
-                                          <p:val>
-                                            <p:strVal val="#ppt_x"/>
-                                          </p:val>
-                                        </p:tav>
-                                      </p:tavLst>
-                                    </p:anim>
-                                    <p:anim calcmode="lin" valueType="num">
-                                      <p:cBhvr additive="base">
-                                        <p:cTn id="42" dur="500" fill="hold"/>
-                                        <p:tgtEl>
-                                          <p:spTgt spid="6"/>
-                                        </p:tgtEl>
-                                        <p:attrNameLst>
-                                          <p:attrName>ppt_y</p:attrName>
-                                        </p:attrNameLst>
-                                      </p:cBhvr>
-                                      <p:tavLst>
-                                        <p:tav tm="0">
-                                          <p:val>
-                                            <p:strVal val="1+#ppt_h/2"/>
-                                          </p:val>
-                                        </p:tav>
-                                        <p:tav tm="100000">
-                                          <p:val>
-                                            <p:strVal val="#ppt_y"/>
-                                          </p:val>
-                                        </p:tav>
-                                      </p:tavLst>
-                                    </p:anim>
-                                  </p:childTnLst>
-                                </p:cTn>
-                              </p:par>
-                              <p:par>
-                                <p:cTn id="43" presetID="2" presetClass="entr" presetSubtype="4" fill="hold" grpId="0" nodeType="withEffect">
-                                  <p:stCondLst>
-                                    <p:cond delay="0"/>
-                                  </p:stCondLst>
-                                  <p:childTnLst>
-                                    <p:set>
-                                      <p:cBhvr>
-                                        <p:cTn id="44" dur="1" fill="hold">
-                                          <p:stCondLst>
-                                            <p:cond delay="0"/>
-                                          </p:stCondLst>
-                                        </p:cTn>
-                                        <p:tgtEl>
-                                          <p:spTgt spid="8"/>
-                                        </p:tgtEl>
-                                        <p:attrNameLst>
-                                          <p:attrName>style.visibility</p:attrName>
-                                        </p:attrNameLst>
-                                      </p:cBhvr>
-                                      <p:to>
-                                        <p:strVal val="visible"/>
-                                      </p:to>
-                                    </p:set>
-                                    <p:anim calcmode="lin" valueType="num">
-                                      <p:cBhvr additive="base">
-                                        <p:cTn id="45" dur="500" fill="hold"/>
-                                        <p:tgtEl>
-                                          <p:spTgt spid="8"/>
-                                        </p:tgtEl>
-                                        <p:attrNameLst>
-                                          <p:attrName>ppt_x</p:attrName>
-                                        </p:attrNameLst>
-                                      </p:cBhvr>
-                                      <p:tavLst>
-                                        <p:tav tm="0">
-                                          <p:val>
-                                            <p:strVal val="#ppt_x"/>
-                                          </p:val>
-                                        </p:tav>
-                                        <p:tav tm="100000">
-                                          <p:val>
-                                            <p:strVal val="#ppt_x"/>
-                                          </p:val>
-                                        </p:tav>
-                                      </p:tavLst>
-                                    </p:anim>
-                                    <p:anim calcmode="lin" valueType="num">
-                                      <p:cBhvr additive="base">
-                                        <p:cTn id="46" dur="500" fill="hold"/>
-                                        <p:tgtEl>
-                                          <p:spTgt spid="8"/>
-                                        </p:tgtEl>
-                                        <p:attrNameLst>
-                                          <p:attrName>ppt_y</p:attrName>
-                                        </p:attrNameLst>
-                                      </p:cBhvr>
-                                      <p:tavLst>
-                                        <p:tav tm="0">
-                                          <p:val>
-                                            <p:strVal val="1+#ppt_h/2"/>
-                                          </p:val>
-                                        </p:tav>
-                                        <p:tav tm="100000">
-                                          <p:val>
-                                            <p:strVal val="#ppt_y"/>
-                                          </p:val>
-                                        </p:tav>
-                                      </p:tavLst>
-                                    </p:anim>
-                                  </p:childTnLst>
-                                </p:cTn>
-                              </p:par>
-                            </p:childTnLst>
-                          </p:cTn>
-                        </p:par>
-                      </p:childTnLst>
-                    </p:cTn>
-                  </p:par>
-                </p:childTnLst>
-              </p:cTn>
-              <p:prevCondLst>
-                <p:cond evt="onPrev" delay="0">
-                  <p:tgtEl>
-                    <p:sldTgt/>
-                  </p:tgtEl>
-                </p:cond>
-              </p:prevCondLst>
-              <p:nextCondLst>
-                <p:cond evt="onNext" delay="0">
-                  <p:tgtEl>
-                    <p:sldTgt/>
-                  </p:tgtEl>
-                </p:cond>
-              </p:nextCondLst>
-            </p:seq>
-          </p:childTnLst>
-        </p:cTn>
-      </p:par>
-    </p:tnLst>
-    <p:bldLst>
-      <p:bldP spid="3" grpId="0" animBg="1"/>
-      <p:bldP spid="4" grpId="0"/>
-      <p:bldP spid="6" grpId="0" animBg="1"/>
-      <p:bldP spid="8" grpId="0"/>
-    </p:bldLst>
-  </p:timing>
 </p:sld>
 </file>
 

</xml_diff>